<commit_message>
Change font and rearranged slides
</commit_message>
<xml_diff>
--- a/HBA.pptx
+++ b/HBA.pptx
@@ -227,7 +227,7 @@
           <a:p>
             <a:fld id="{9D3844FE-75E8-42EC-9FAF-5ED5643C11B9}" type="datetimeFigureOut">
               <a:rPr lang="en-IN" smtClean="0"/>
-              <a:t>30-09-2015</a:t>
+              <a:t>01-10-2015</a:t>
             </a:fld>
             <a:endParaRPr lang="en-IN"/>
           </a:p>
@@ -579,6 +579,148 @@
 </p:notes>
 </file>
 
+<file path=ppt/notesSlides/notesSlide2.xml><?xml version="1.0" encoding="utf-8"?>
+<p:notes xmlns:a="http://schemas.openxmlformats.org/drawingml/2006/main" xmlns:r="http://schemas.openxmlformats.org/officeDocument/2006/relationships" xmlns:p="http://schemas.openxmlformats.org/presentationml/2006/main">
+  <p:cSld>
+    <p:spTree>
+      <p:nvGrpSpPr>
+        <p:cNvPr id="1" name=""/>
+        <p:cNvGrpSpPr/>
+        <p:nvPr/>
+      </p:nvGrpSpPr>
+      <p:grpSpPr>
+        <a:xfrm>
+          <a:off x="0" y="0"/>
+          <a:ext cx="0" cy="0"/>
+          <a:chOff x="0" y="0"/>
+          <a:chExt cx="0" cy="0"/>
+        </a:xfrm>
+      </p:grpSpPr>
+      <p:sp>
+        <p:nvSpPr>
+          <p:cNvPr id="2" name="Slide Image Placeholder 1"/>
+          <p:cNvSpPr>
+            <a:spLocks noGrp="1" noRot="1" noChangeAspect="1"/>
+          </p:cNvSpPr>
+          <p:nvPr>
+            <p:ph type="sldImg"/>
+          </p:nvPr>
+        </p:nvSpPr>
+        <p:spPr/>
+      </p:sp>
+      <p:sp>
+        <p:nvSpPr>
+          <p:cNvPr id="3" name="Notes Placeholder 2"/>
+          <p:cNvSpPr>
+            <a:spLocks noGrp="1"/>
+          </p:cNvSpPr>
+          <p:nvPr>
+            <p:ph type="body" idx="1"/>
+          </p:nvPr>
+        </p:nvSpPr>
+        <p:spPr/>
+        <p:txBody>
+          <a:bodyPr/>
+          <a:lstStyle/>
+          <a:p>
+            <a:r>
+              <a:rPr lang="en-IN" sz="1200" kern="1200" dirty="0" smtClean="0">
+                <a:solidFill>
+                  <a:schemeClr val="tx1"/>
+                </a:solidFill>
+                <a:latin typeface="+mn-lt"/>
+                <a:ea typeface="+mn-ea"/>
+                <a:cs typeface="+mn-cs"/>
+              </a:rPr>
+              <a:t>Perturbed uniform meshes are generated by perturbing the coordinates of each point</a:t>
+            </a:r>
+          </a:p>
+          <a:p>
+            <a:r>
+              <a:rPr lang="en-IN" sz="1200" kern="1200" dirty="0" smtClean="0">
+                <a:solidFill>
+                  <a:schemeClr val="tx1"/>
+                </a:solidFill>
+                <a:latin typeface="+mn-lt"/>
+                <a:ea typeface="+mn-ea"/>
+                <a:cs typeface="+mn-cs"/>
+              </a:rPr>
+              <a:t>of a given uniform mesh by a random number in the range [-a · h, a · h]. where h is the</a:t>
+            </a:r>
+          </a:p>
+          <a:p>
+            <a:r>
+              <a:rPr lang="en-IN" sz="1200" kern="1200" dirty="0" smtClean="0">
+                <a:solidFill>
+                  <a:schemeClr val="tx1"/>
+                </a:solidFill>
+                <a:latin typeface="+mn-lt"/>
+                <a:ea typeface="+mn-ea"/>
+                <a:cs typeface="+mn-cs"/>
+              </a:rPr>
+              <a:t>step size of the underlying uniform mesh and 0 &lt; </a:t>
+            </a:r>
+            <a:r>
+              <a:rPr lang="en-IN" sz="1200" kern="1200" dirty="0" smtClean="0">
+                <a:solidFill>
+                  <a:schemeClr val="tx1"/>
+                </a:solidFill>
+                <a:latin typeface="Cambria Math" panose="02040503050406030204" pitchFamily="18" charset="0"/>
+                <a:ea typeface="Cambria Math" panose="02040503050406030204" pitchFamily="18" charset="0"/>
+                <a:cs typeface="+mn-cs"/>
+              </a:rPr>
+              <a:t>∝</a:t>
+            </a:r>
+            <a:r>
+              <a:rPr lang="en-IN" sz="1200" kern="1200" dirty="0" smtClean="0">
+                <a:solidFill>
+                  <a:schemeClr val="tx1"/>
+                </a:solidFill>
+                <a:latin typeface="+mn-lt"/>
+                <a:ea typeface="+mn-ea"/>
+                <a:cs typeface="+mn-cs"/>
+              </a:rPr>
+              <a:t> &lt; 0.5.</a:t>
+            </a:r>
+          </a:p>
+        </p:txBody>
+      </p:sp>
+      <p:sp>
+        <p:nvSpPr>
+          <p:cNvPr id="4" name="Slide Number Placeholder 3"/>
+          <p:cNvSpPr>
+            <a:spLocks noGrp="1"/>
+          </p:cNvSpPr>
+          <p:nvPr>
+            <p:ph type="sldNum" sz="quarter" idx="10"/>
+          </p:nvPr>
+        </p:nvSpPr>
+        <p:spPr/>
+        <p:txBody>
+          <a:bodyPr/>
+          <a:lstStyle/>
+          <a:p>
+            <a:fld id="{2D864A7F-DB0C-459E-9BB9-C1B752124977}" type="slidenum">
+              <a:rPr lang="en-IN" smtClean="0"/>
+              <a:t>17</a:t>
+            </a:fld>
+            <a:endParaRPr lang="en-IN"/>
+          </a:p>
+        </p:txBody>
+      </p:sp>
+    </p:spTree>
+    <p:extLst>
+      <p:ext uri="{BB962C8B-B14F-4D97-AF65-F5344CB8AC3E}">
+        <p14:creationId xmlns:p14="http://schemas.microsoft.com/office/powerpoint/2010/main" val="2005983231"/>
+      </p:ext>
+    </p:extLst>
+  </p:cSld>
+  <p:clrMapOvr>
+    <a:masterClrMapping/>
+  </p:clrMapOvr>
+</p:notes>
+</file>
+
 <file path=ppt/slideLayouts/slideLayout1.xml><?xml version="1.0" encoding="utf-8"?>
 <p:sldLayout xmlns:a="http://schemas.openxmlformats.org/drawingml/2006/main" xmlns:r="http://schemas.openxmlformats.org/officeDocument/2006/relationships" xmlns:p="http://schemas.openxmlformats.org/presentationml/2006/main" type="title" preserve="1">
   <p:cSld name="Title Slide">
@@ -710,7 +852,7 @@
           <a:p>
             <a:fld id="{6B3F88B7-D2AF-443E-A3B2-304D2EAF07AE}" type="datetimeFigureOut">
               <a:rPr lang="en-IN" smtClean="0"/>
-              <a:t>30-09-2015</a:t>
+              <a:t>01-10-2015</a:t>
             </a:fld>
             <a:endParaRPr lang="en-IN"/>
           </a:p>
@@ -880,7 +1022,7 @@
           <a:p>
             <a:fld id="{6B3F88B7-D2AF-443E-A3B2-304D2EAF07AE}" type="datetimeFigureOut">
               <a:rPr lang="en-IN" smtClean="0"/>
-              <a:t>30-09-2015</a:t>
+              <a:t>01-10-2015</a:t>
             </a:fld>
             <a:endParaRPr lang="en-IN"/>
           </a:p>
@@ -1060,7 +1202,7 @@
           <a:p>
             <a:fld id="{6B3F88B7-D2AF-443E-A3B2-304D2EAF07AE}" type="datetimeFigureOut">
               <a:rPr lang="en-IN" smtClean="0"/>
-              <a:t>30-09-2015</a:t>
+              <a:t>01-10-2015</a:t>
             </a:fld>
             <a:endParaRPr lang="en-IN"/>
           </a:p>
@@ -1230,7 +1372,7 @@
           <a:p>
             <a:fld id="{6B3F88B7-D2AF-443E-A3B2-304D2EAF07AE}" type="datetimeFigureOut">
               <a:rPr lang="en-IN" smtClean="0"/>
-              <a:t>30-09-2015</a:t>
+              <a:t>01-10-2015</a:t>
             </a:fld>
             <a:endParaRPr lang="en-IN"/>
           </a:p>
@@ -1476,7 +1618,7 @@
           <a:p>
             <a:fld id="{6B3F88B7-D2AF-443E-A3B2-304D2EAF07AE}" type="datetimeFigureOut">
               <a:rPr lang="en-IN" smtClean="0"/>
-              <a:t>30-09-2015</a:t>
+              <a:t>01-10-2015</a:t>
             </a:fld>
             <a:endParaRPr lang="en-IN"/>
           </a:p>
@@ -1708,7 +1850,7 @@
           <a:p>
             <a:fld id="{6B3F88B7-D2AF-443E-A3B2-304D2EAF07AE}" type="datetimeFigureOut">
               <a:rPr lang="en-IN" smtClean="0"/>
-              <a:t>30-09-2015</a:t>
+              <a:t>01-10-2015</a:t>
             </a:fld>
             <a:endParaRPr lang="en-IN"/>
           </a:p>
@@ -2075,7 +2217,7 @@
           <a:p>
             <a:fld id="{6B3F88B7-D2AF-443E-A3B2-304D2EAF07AE}" type="datetimeFigureOut">
               <a:rPr lang="en-IN" smtClean="0"/>
-              <a:t>30-09-2015</a:t>
+              <a:t>01-10-2015</a:t>
             </a:fld>
             <a:endParaRPr lang="en-IN"/>
           </a:p>
@@ -2193,7 +2335,7 @@
           <a:p>
             <a:fld id="{6B3F88B7-D2AF-443E-A3B2-304D2EAF07AE}" type="datetimeFigureOut">
               <a:rPr lang="en-IN" smtClean="0"/>
-              <a:t>30-09-2015</a:t>
+              <a:t>01-10-2015</a:t>
             </a:fld>
             <a:endParaRPr lang="en-IN"/>
           </a:p>
@@ -2288,7 +2430,7 @@
           <a:p>
             <a:fld id="{6B3F88B7-D2AF-443E-A3B2-304D2EAF07AE}" type="datetimeFigureOut">
               <a:rPr lang="en-IN" smtClean="0"/>
-              <a:t>30-09-2015</a:t>
+              <a:t>01-10-2015</a:t>
             </a:fld>
             <a:endParaRPr lang="en-IN"/>
           </a:p>
@@ -2565,7 +2707,7 @@
           <a:p>
             <a:fld id="{6B3F88B7-D2AF-443E-A3B2-304D2EAF07AE}" type="datetimeFigureOut">
               <a:rPr lang="en-IN" smtClean="0"/>
-              <a:t>30-09-2015</a:t>
+              <a:t>01-10-2015</a:t>
             </a:fld>
             <a:endParaRPr lang="en-IN"/>
           </a:p>
@@ -2818,7 +2960,7 @@
           <a:p>
             <a:fld id="{6B3F88B7-D2AF-443E-A3B2-304D2EAF07AE}" type="datetimeFigureOut">
               <a:rPr lang="en-IN" smtClean="0"/>
-              <a:t>30-09-2015</a:t>
+              <a:t>01-10-2015</a:t>
             </a:fld>
             <a:endParaRPr lang="en-IN"/>
           </a:p>
@@ -3031,7 +3173,7 @@
           <a:p>
             <a:fld id="{6B3F88B7-D2AF-443E-A3B2-304D2EAF07AE}" type="datetimeFigureOut">
               <a:rPr lang="en-IN" smtClean="0"/>
-              <a:t>30-09-2015</a:t>
+              <a:t>01-10-2015</a:t>
             </a:fld>
             <a:endParaRPr lang="en-IN"/>
           </a:p>
@@ -4518,14 +4660,7 @@
                 <a:latin typeface="Times New Roman" panose="02020603050405020304" pitchFamily="18" charset="0"/>
                 <a:cs typeface="Times New Roman" panose="02020603050405020304" pitchFamily="18" charset="0"/>
               </a:rPr>
-              <a:t>Numerical Comparison</a:t>
-            </a:r>
-            <a:r>
-              <a:rPr lang="en-IN" sz="3200" b="1" dirty="0" smtClean="0">
-                <a:latin typeface="Times New Roman" panose="02020603050405020304" pitchFamily="18" charset="0"/>
-                <a:cs typeface="Times New Roman" panose="02020603050405020304" pitchFamily="18" charset="0"/>
-              </a:rPr>
-              <a:t>: </a:t>
+              <a:t>Numerical Comparison: </a:t>
             </a:r>
             <a:r>
               <a:rPr lang="en-IN" sz="2800" b="1" dirty="0" smtClean="0">
@@ -5259,6 +5394,9 @@
           </a:bodyPr>
           <a:lstStyle/>
           <a:p>
+            <a:pPr marL="0" indent="0">
+              <a:buNone/>
+            </a:pPr>
             <a:r>
               <a:rPr lang="en-IN" sz="2400" b="1" dirty="0"/>
               <a:t>QLS Hessian </a:t>
@@ -5431,7 +5569,7 @@
           <p:nvPr/>
         </p:nvPicPr>
         <p:blipFill>
-          <a:blip r:embed="rId2"/>
+          <a:blip r:embed="rId3"/>
           <a:stretch>
             <a:fillRect/>
           </a:stretch>
@@ -5536,6 +5674,9 @@
           <a:bodyPr/>
           <a:lstStyle/>
           <a:p>
+            <a:pPr marL="0" indent="0">
+              <a:buNone/>
+            </a:pPr>
             <a:r>
               <a:rPr lang="en-IN" sz="2400" b="1" dirty="0" smtClean="0">
                 <a:latin typeface="Times New Roman" panose="02020603050405020304" pitchFamily="18" charset="0"/>
@@ -5843,14 +5984,7 @@
                 <a:latin typeface="Times New Roman" panose="02020603050405020304" pitchFamily="18" charset="0"/>
                 <a:cs typeface="Times New Roman" panose="02020603050405020304" pitchFamily="18" charset="0"/>
               </a:rPr>
-              <a:t>What is </a:t>
-            </a:r>
-            <a:r>
-              <a:rPr lang="en-IN" sz="3200" b="1" dirty="0" smtClean="0">
-                <a:latin typeface="Times New Roman" panose="02020603050405020304" pitchFamily="18" charset="0"/>
-                <a:cs typeface="Times New Roman" panose="02020603050405020304" pitchFamily="18" charset="0"/>
-              </a:rPr>
-              <a:t>HBA?</a:t>
+              <a:t>What is HBA?</a:t>
             </a:r>
             <a:endParaRPr lang="en-IN" sz="3200" b="1" dirty="0">
               <a:latin typeface="Times New Roman" panose="02020603050405020304" pitchFamily="18" charset="0"/>
@@ -5905,49 +6039,35 @@
                 <a:latin typeface="Times New Roman" panose="02020603050405020304" pitchFamily="18" charset="0"/>
                 <a:cs typeface="Times New Roman" panose="02020603050405020304" pitchFamily="18" charset="0"/>
               </a:rPr>
-              <a:t>If this error involves the second order derivative of the exact solution then it is called </a:t>
+              <a:t>If this error involves the second order derivative of the exact solution then it is called Hessian </a:t>
+            </a:r>
+            <a:r>
+              <a:rPr lang="en-IN" dirty="0">
+                <a:latin typeface="Times New Roman" panose="02020603050405020304" pitchFamily="18" charset="0"/>
+                <a:cs typeface="Times New Roman" panose="02020603050405020304" pitchFamily="18" charset="0"/>
+              </a:rPr>
+              <a:t>B</a:t>
             </a:r>
             <a:r>
               <a:rPr lang="en-IN" dirty="0" smtClean="0">
                 <a:latin typeface="Times New Roman" panose="02020603050405020304" pitchFamily="18" charset="0"/>
                 <a:cs typeface="Times New Roman" panose="02020603050405020304" pitchFamily="18" charset="0"/>
               </a:rPr>
-              <a:t>Hessian </a:t>
+              <a:t>ased </a:t>
             </a:r>
             <a:r>
               <a:rPr lang="en-IN" dirty="0">
                 <a:latin typeface="Times New Roman" panose="02020603050405020304" pitchFamily="18" charset="0"/>
                 <a:cs typeface="Times New Roman" panose="02020603050405020304" pitchFamily="18" charset="0"/>
               </a:rPr>
-              <a:t>B</a:t>
+              <a:t>A</a:t>
             </a:r>
             <a:r>
               <a:rPr lang="en-IN" dirty="0" smtClean="0">
                 <a:latin typeface="Times New Roman" panose="02020603050405020304" pitchFamily="18" charset="0"/>
                 <a:cs typeface="Times New Roman" panose="02020603050405020304" pitchFamily="18" charset="0"/>
               </a:rPr>
-              <a:t>ased </a:t>
-            </a:r>
-            <a:r>
-              <a:rPr lang="en-IN" dirty="0">
-                <a:latin typeface="Times New Roman" panose="02020603050405020304" pitchFamily="18" charset="0"/>
-                <a:cs typeface="Times New Roman" panose="02020603050405020304" pitchFamily="18" charset="0"/>
-              </a:rPr>
-              <a:t>A</a:t>
-            </a:r>
-            <a:r>
-              <a:rPr lang="en-IN" dirty="0" smtClean="0">
-                <a:latin typeface="Times New Roman" panose="02020603050405020304" pitchFamily="18" charset="0"/>
-                <a:cs typeface="Times New Roman" panose="02020603050405020304" pitchFamily="18" charset="0"/>
-              </a:rPr>
-              <a:t>daptivity</a:t>
-            </a:r>
-            <a:r>
-              <a:rPr lang="en-IN" dirty="0" smtClean="0">
-                <a:latin typeface="Times New Roman" panose="02020603050405020304" pitchFamily="18" charset="0"/>
-                <a:cs typeface="Times New Roman" panose="02020603050405020304" pitchFamily="18" charset="0"/>
-              </a:rPr>
-              <a:t>.</a:t>
+              <a:t>daptivity.</a:t>
             </a:r>
           </a:p>
           <a:p>
@@ -5963,10 +6083,6 @@
               </a:rPr>
               <a:t>E.g. </a:t>
             </a:r>
-            <a:endParaRPr lang="en-IN" dirty="0" smtClean="0">
-              <a:latin typeface="Times New Roman" panose="02020603050405020304" pitchFamily="18" charset="0"/>
-              <a:cs typeface="Times New Roman" panose="02020603050405020304" pitchFamily="18" charset="0"/>
-            </a:endParaRPr>
           </a:p>
           <a:p>
             <a:pPr>
@@ -5997,42 +6113,21 @@
                 <a:latin typeface="Times New Roman" panose="02020603050405020304" pitchFamily="18" charset="0"/>
                 <a:cs typeface="Times New Roman" panose="02020603050405020304" pitchFamily="18" charset="0"/>
               </a:rPr>
-              <a:t>-exact </a:t>
+              <a:t>-exact solution, </a:t>
+            </a:r>
+            <a:r>
+              <a:rPr lang="el-GR" dirty="0" smtClean="0">
+                <a:latin typeface="Times New Roman" panose="02020603050405020304" pitchFamily="18" charset="0"/>
+                <a:cs typeface="Times New Roman" panose="02020603050405020304" pitchFamily="18" charset="0"/>
+              </a:rPr>
+              <a:t>Ω</a:t>
             </a:r>
             <a:r>
               <a:rPr lang="en-IN" dirty="0" smtClean="0">
                 <a:latin typeface="Times New Roman" panose="02020603050405020304" pitchFamily="18" charset="0"/>
                 <a:cs typeface="Times New Roman" panose="02020603050405020304" pitchFamily="18" charset="0"/>
               </a:rPr>
-              <a:t>solution, </a:t>
-            </a:r>
-            <a:r>
-              <a:rPr lang="el-GR" dirty="0" smtClean="0">
-                <a:latin typeface="Times New Roman" panose="02020603050405020304" pitchFamily="18" charset="0"/>
-                <a:cs typeface="Times New Roman" panose="02020603050405020304" pitchFamily="18" charset="0"/>
-              </a:rPr>
-              <a:t>Ω</a:t>
-            </a:r>
-            <a:r>
-              <a:rPr lang="en-IN" dirty="0" smtClean="0">
-                <a:latin typeface="Times New Roman" panose="02020603050405020304" pitchFamily="18" charset="0"/>
-                <a:cs typeface="Times New Roman" panose="02020603050405020304" pitchFamily="18" charset="0"/>
-              </a:rPr>
-              <a:t> </a:t>
-            </a:r>
-            <a:r>
-              <a:rPr lang="en-IN" dirty="0" smtClean="0">
-                <a:latin typeface="Times New Roman" panose="02020603050405020304" pitchFamily="18" charset="0"/>
-                <a:cs typeface="Times New Roman" panose="02020603050405020304" pitchFamily="18" charset="0"/>
-              </a:rPr>
-              <a:t>is </a:t>
-            </a:r>
-            <a:r>
-              <a:rPr lang="en-IN" dirty="0" smtClean="0">
-                <a:latin typeface="Times New Roman" panose="02020603050405020304" pitchFamily="18" charset="0"/>
-                <a:cs typeface="Times New Roman" panose="02020603050405020304" pitchFamily="18" charset="0"/>
-              </a:rPr>
-              <a:t>domain, </a:t>
+              <a:t> is domain, </a:t>
             </a:r>
             <a:r>
               <a:rPr lang="en-IN" i="1" dirty="0" smtClean="0">
@@ -6206,14 +6301,7 @@
                 <a:latin typeface="Times New Roman" panose="02020603050405020304" pitchFamily="18" charset="0"/>
                 <a:cs typeface="Times New Roman" panose="02020603050405020304" pitchFamily="18" charset="0"/>
               </a:rPr>
-              <a:t>For </a:t>
-            </a:r>
-            <a:r>
-              <a:rPr lang="en-IN" sz="2200" dirty="0" smtClean="0">
-                <a:latin typeface="Times New Roman" panose="02020603050405020304" pitchFamily="18" charset="0"/>
-                <a:cs typeface="Times New Roman" panose="02020603050405020304" pitchFamily="18" charset="0"/>
-              </a:rPr>
-              <a:t>function </a:t>
+              <a:t>For function </a:t>
             </a:r>
             <a:r>
               <a:rPr lang="en-IN" sz="2200" i="1" dirty="0" err="1" smtClean="0">
@@ -6569,77 +6657,79 @@
           </a:xfrm>
         </p:spPr>
         <p:txBody>
-          <a:bodyPr/>
-          <a:lstStyle/>
-          <a:p>
-            <a:r>
-              <a:rPr lang="en-IN" sz="2200" dirty="0" smtClean="0">
+          <a:bodyPr>
+            <a:normAutofit/>
+          </a:bodyPr>
+          <a:lstStyle/>
+          <a:p>
+            <a:r>
+              <a:rPr lang="en-IN" sz="2400" dirty="0" smtClean="0">
                 <a:latin typeface="Times New Roman" panose="02020603050405020304" pitchFamily="18" charset="0"/>
                 <a:cs typeface="Times New Roman" panose="02020603050405020304" pitchFamily="18" charset="0"/>
               </a:rPr>
               <a:t>For the test function: </a:t>
             </a:r>
             <a:r>
-              <a:rPr lang="en-IN" sz="2200" i="1" dirty="0" err="1" smtClean="0">
+              <a:rPr lang="en-IN" sz="2400" i="1" dirty="0" err="1" smtClean="0">
                 <a:latin typeface="Times New Roman" panose="02020603050405020304" pitchFamily="18" charset="0"/>
                 <a:cs typeface="Times New Roman" panose="02020603050405020304" pitchFamily="18" charset="0"/>
               </a:rPr>
               <a:t>u</a:t>
             </a:r>
             <a:r>
-              <a:rPr lang="en-IN" sz="2200" i="1" baseline="-25000" dirty="0" err="1" smtClean="0">
+              <a:rPr lang="en-IN" sz="2400" i="1" baseline="-25000" dirty="0" err="1" smtClean="0">
                 <a:latin typeface="Times New Roman" panose="02020603050405020304" pitchFamily="18" charset="0"/>
                 <a:cs typeface="Times New Roman" panose="02020603050405020304" pitchFamily="18" charset="0"/>
               </a:rPr>
               <a:t>BL</a:t>
             </a:r>
             <a:r>
-              <a:rPr lang="en-IN" sz="2200" i="1" dirty="0" smtClean="0">
+              <a:rPr lang="en-IN" sz="2400" i="1" dirty="0" smtClean="0">
                 <a:latin typeface="Times New Roman" panose="02020603050405020304" pitchFamily="18" charset="0"/>
                 <a:cs typeface="Times New Roman" panose="02020603050405020304" pitchFamily="18" charset="0"/>
               </a:rPr>
               <a:t>(</a:t>
             </a:r>
             <a:r>
-              <a:rPr lang="en-IN" sz="2200" i="1" dirty="0" err="1" smtClean="0">
+              <a:rPr lang="en-IN" sz="2400" i="1" dirty="0" err="1" smtClean="0">
                 <a:latin typeface="Times New Roman" panose="02020603050405020304" pitchFamily="18" charset="0"/>
                 <a:cs typeface="Times New Roman" panose="02020603050405020304" pitchFamily="18" charset="0"/>
               </a:rPr>
               <a:t>x,y</a:t>
             </a:r>
             <a:r>
-              <a:rPr lang="en-IN" sz="2200" i="1" dirty="0" smtClean="0">
+              <a:rPr lang="en-IN" sz="2400" i="1" dirty="0" smtClean="0">
                 <a:latin typeface="Times New Roman" panose="02020603050405020304" pitchFamily="18" charset="0"/>
                 <a:cs typeface="Times New Roman" panose="02020603050405020304" pitchFamily="18" charset="0"/>
               </a:rPr>
               <a:t>)=e</a:t>
             </a:r>
             <a:r>
-              <a:rPr lang="en-IN" sz="2200" i="1" baseline="30000" dirty="0" smtClean="0">
+              <a:rPr lang="en-IN" sz="2400" i="1" baseline="30000" dirty="0" smtClean="0">
                 <a:latin typeface="Times New Roman" panose="02020603050405020304" pitchFamily="18" charset="0"/>
                 <a:cs typeface="Times New Roman" panose="02020603050405020304" pitchFamily="18" charset="0"/>
               </a:rPr>
               <a:t>-25x</a:t>
             </a:r>
             <a:r>
-              <a:rPr lang="en-IN" sz="2200" i="1" dirty="0" smtClean="0">
+              <a:rPr lang="en-IN" sz="2400" i="1" dirty="0" smtClean="0">
                 <a:latin typeface="Times New Roman" panose="02020603050405020304" pitchFamily="18" charset="0"/>
                 <a:cs typeface="Times New Roman" panose="02020603050405020304" pitchFamily="18" charset="0"/>
               </a:rPr>
               <a:t>+e</a:t>
             </a:r>
             <a:r>
-              <a:rPr lang="en-IN" sz="2200" i="1" baseline="30000" dirty="0" smtClean="0">
+              <a:rPr lang="en-IN" sz="2400" i="1" baseline="30000" dirty="0" smtClean="0">
                 <a:latin typeface="Times New Roman" panose="02020603050405020304" pitchFamily="18" charset="0"/>
                 <a:cs typeface="Times New Roman" panose="02020603050405020304" pitchFamily="18" charset="0"/>
               </a:rPr>
               <a:t>-25y</a:t>
             </a:r>
             <a:r>
-              <a:rPr lang="en-IN" sz="2200" i="1" dirty="0" smtClean="0"/>
+              <a:rPr lang="en-IN" sz="2400" i="1" dirty="0" smtClean="0"/>
               <a:t>.</a:t>
             </a:r>
-            <a:endParaRPr lang="en-IN" sz="2200" dirty="0"/>
+            <a:endParaRPr lang="en-IN" sz="2400" dirty="0"/>
           </a:p>
         </p:txBody>
       </p:sp>
@@ -7250,14 +7340,7 @@
                 <a:latin typeface="Times New Roman" panose="02020603050405020304" pitchFamily="18" charset="0"/>
                 <a:cs typeface="Times New Roman" panose="02020603050405020304" pitchFamily="18" charset="0"/>
               </a:rPr>
-              <a:t>Delaunay </a:t>
-            </a:r>
-            <a:r>
-              <a:rPr lang="en-IN" sz="3200" b="1" dirty="0" smtClean="0">
-                <a:latin typeface="Times New Roman" panose="02020603050405020304" pitchFamily="18" charset="0"/>
-                <a:cs typeface="Times New Roman" panose="02020603050405020304" pitchFamily="18" charset="0"/>
-              </a:rPr>
-              <a:t>Meshes:</a:t>
+              <a:t>Delaunay Meshes:</a:t>
             </a:r>
             <a:endParaRPr lang="en-IN" sz="3200" b="1" dirty="0">
               <a:latin typeface="Times New Roman" panose="02020603050405020304" pitchFamily="18" charset="0"/>
@@ -7293,30 +7376,16 @@
                 <a:latin typeface="Times New Roman" panose="02020603050405020304" pitchFamily="18" charset="0"/>
                 <a:cs typeface="Times New Roman" panose="02020603050405020304" pitchFamily="18" charset="0"/>
               </a:rPr>
-              <a:t>It </a:t>
-            </a:r>
+              <a:t>It can be observed that Hessian recovery results for Delaunay meshes are identical to results obtained on mildly perturbed meshes. Delaunay meshes as well as 5% randomly perturbed meshes are both non-uniform but still well-shaped. </a:t>
+            </a:r>
+          </a:p>
+          <a:p>
             <a:r>
               <a:rPr lang="en-IN" sz="2200" dirty="0" smtClean="0">
                 <a:latin typeface="Times New Roman" panose="02020603050405020304" pitchFamily="18" charset="0"/>
                 <a:cs typeface="Times New Roman" panose="02020603050405020304" pitchFamily="18" charset="0"/>
               </a:rPr>
-              <a:t>can be observed that Hessian recovery results for Delaunay meshes are identical to results obtained on mildly perturbed meshes. Delaunay meshes as well as 5% randomly perturbed meshes are both non-uniform but still well-shaped. </a:t>
-            </a:r>
-          </a:p>
-          <a:p>
-            <a:r>
-              <a:rPr lang="en-IN" sz="2200" dirty="0" smtClean="0">
-                <a:latin typeface="Times New Roman" panose="02020603050405020304" pitchFamily="18" charset="0"/>
-                <a:cs typeface="Times New Roman" panose="02020603050405020304" pitchFamily="18" charset="0"/>
-              </a:rPr>
-              <a:t>QLS is the only method to converge with an approximate convergence rate </a:t>
-            </a:r>
-            <a:r>
-              <a:rPr lang="en-IN" sz="2200" dirty="0" smtClean="0">
-                <a:latin typeface="Times New Roman" panose="02020603050405020304" pitchFamily="18" charset="0"/>
-                <a:cs typeface="Times New Roman" panose="02020603050405020304" pitchFamily="18" charset="0"/>
-              </a:rPr>
-              <a:t>of O(n</a:t>
+              <a:t>QLS is the only method to converge with an approximate convergence rate of O(n</a:t>
             </a:r>
             <a:r>
               <a:rPr lang="en-IN" sz="2200" baseline="30000" dirty="0" smtClean="0">
@@ -7565,13 +7634,13 @@
         </p:nvSpPr>
         <p:spPr>
           <a:xfrm>
-            <a:off x="909637" y="179389"/>
+            <a:off x="852487" y="108550"/>
             <a:ext cx="10515600" cy="677861"/>
           </a:xfrm>
         </p:spPr>
         <p:txBody>
           <a:bodyPr>
-            <a:normAutofit/>
+            <a:normAutofit fontScale="90000"/>
           </a:bodyPr>
           <a:lstStyle/>
           <a:p>
@@ -7596,22 +7665,66 @@
               </a:rPr>
               <a:t>Meshes:</a:t>
             </a:r>
-            <a:endParaRPr lang="en-IN" sz="3200" b="1" dirty="0">
+            <a:r>
+              <a:rPr lang="en-IN" sz="2400" dirty="0">
+                <a:latin typeface="Times New Roman" panose="02020603050405020304" pitchFamily="18" charset="0"/>
+                <a:cs typeface="Times New Roman" panose="02020603050405020304" pitchFamily="18" charset="0"/>
+              </a:rPr>
+              <a:t/>
+            </a:r>
+            <a:br>
+              <a:rPr lang="en-IN" sz="2400" dirty="0">
+                <a:latin typeface="Times New Roman" panose="02020603050405020304" pitchFamily="18" charset="0"/>
+                <a:cs typeface="Times New Roman" panose="02020603050405020304" pitchFamily="18" charset="0"/>
+              </a:rPr>
+            </a:br>
+            <a:endParaRPr lang="en-IN" sz="2400" b="1" dirty="0">
               <a:latin typeface="Times New Roman" panose="02020603050405020304" pitchFamily="18" charset="0"/>
               <a:cs typeface="Times New Roman" panose="02020603050405020304" pitchFamily="18" charset="0"/>
             </a:endParaRPr>
           </a:p>
         </p:txBody>
       </p:sp>
+      <p:sp>
+        <p:nvSpPr>
+          <p:cNvPr id="3" name="Content Placeholder 2"/>
+          <p:cNvSpPr>
+            <a:spLocks noGrp="1"/>
+          </p:cNvSpPr>
+          <p:nvPr>
+            <p:ph idx="1"/>
+          </p:nvPr>
+        </p:nvSpPr>
+        <p:spPr>
+          <a:xfrm>
+            <a:off x="852487" y="547493"/>
+            <a:ext cx="10515600" cy="4351338"/>
+          </a:xfrm>
+        </p:spPr>
+        <p:txBody>
+          <a:bodyPr>
+            <a:normAutofit/>
+          </a:bodyPr>
+          <a:lstStyle/>
+          <a:p>
+            <a:r>
+              <a:rPr lang="en-IN" sz="2200" dirty="0">
+                <a:latin typeface="Times New Roman" panose="02020603050405020304" pitchFamily="18" charset="0"/>
+                <a:cs typeface="Times New Roman" panose="02020603050405020304" pitchFamily="18" charset="0"/>
+              </a:rPr>
+              <a:t>QLS is exact for quadratic function. For other functions, QLS provides a convergent recovery and a smaller error than on Delaunay meshes(specially for boundary layer and anisotropic function).</a:t>
+            </a:r>
+            <a:endParaRPr lang="en-IN" sz="2200" dirty="0"/>
+          </a:p>
+        </p:txBody>
+      </p:sp>
       <p:pic>
         <p:nvPicPr>
-          <p:cNvPr id="4" name="Content Placeholder 3"/>
+          <p:cNvPr id="5" name="Picture 4"/>
           <p:cNvPicPr>
-            <a:picLocks noGrp="1" noChangeAspect="1"/>
+            <a:picLocks noChangeAspect="1"/>
           </p:cNvPicPr>
-          <p:nvPr>
-            <p:ph idx="1"/>
-          </p:nvPr>
+          <p:nvPr/>
         </p:nvPicPr>
         <p:blipFill>
           <a:blip r:embed="rId2"/>
@@ -7621,8 +7734,8 @@
         </p:blipFill>
         <p:spPr>
           <a:xfrm>
-            <a:off x="1343025" y="857250"/>
-            <a:ext cx="7858125" cy="5743574"/>
+            <a:off x="1457324" y="1495422"/>
+            <a:ext cx="9001125" cy="5362578"/>
           </a:xfrm>
           <a:prstGeom prst="rect">
             <a:avLst/>
@@ -7726,27 +7839,10 @@
                 <a:spcPts val="600"/>
               </a:spcBef>
             </a:pPr>
-            <a:r>
-              <a:rPr lang="en-IN" sz="2200" dirty="0">
-                <a:latin typeface="Times New Roman" panose="02020603050405020304" pitchFamily="18" charset="0"/>
-                <a:cs typeface="Times New Roman" panose="02020603050405020304" pitchFamily="18" charset="0"/>
-              </a:rPr>
-              <a:t>QLS is exact for quadratic </a:t>
-            </a:r>
-            <a:r>
-              <a:rPr lang="en-IN" sz="2200" dirty="0" smtClean="0">
-                <a:latin typeface="Times New Roman" panose="02020603050405020304" pitchFamily="18" charset="0"/>
-                <a:cs typeface="Times New Roman" panose="02020603050405020304" pitchFamily="18" charset="0"/>
-              </a:rPr>
-              <a:t>function. For </a:t>
-            </a:r>
-            <a:r>
-              <a:rPr lang="en-IN" sz="2200" dirty="0">
-                <a:latin typeface="Times New Roman" panose="02020603050405020304" pitchFamily="18" charset="0"/>
-                <a:cs typeface="Times New Roman" panose="02020603050405020304" pitchFamily="18" charset="0"/>
-              </a:rPr>
-              <a:t>other functions, QLS provides a convergent recovery and a smaller error than on Delaunay meshes(specially for boundary layer and anisotropic function).</a:t>
-            </a:r>
+            <a:endParaRPr lang="en-IN" sz="2200" dirty="0">
+              <a:latin typeface="Times New Roman" panose="02020603050405020304" pitchFamily="18" charset="0"/>
+              <a:cs typeface="Times New Roman" panose="02020603050405020304" pitchFamily="18" charset="0"/>
+            </a:endParaRPr>
           </a:p>
         </p:txBody>
       </p:sp>
@@ -7766,7 +7862,7 @@
         </p:blipFill>
         <p:spPr>
           <a:xfrm>
-            <a:off x="1196579" y="1657349"/>
+            <a:off x="1196579" y="928688"/>
             <a:ext cx="9313068" cy="5305425"/>
           </a:xfrm>
           <a:prstGeom prst="rect">
@@ -8121,14 +8217,7 @@
                 <a:latin typeface="Times New Roman" panose="02020603050405020304" pitchFamily="18" charset="0"/>
                 <a:cs typeface="Times New Roman" panose="02020603050405020304" pitchFamily="18" charset="0"/>
               </a:rPr>
-              <a:t>DLF, LLS and WF are only convergent only for uniform meshes. For non-uniform meshes they fail to provide convergent Hessian recovery</a:t>
-            </a:r>
-            <a:r>
-              <a:rPr lang="en-IN" sz="2200" dirty="0" smtClean="0">
-                <a:latin typeface="Times New Roman" panose="02020603050405020304" pitchFamily="18" charset="0"/>
-                <a:cs typeface="Times New Roman" panose="02020603050405020304" pitchFamily="18" charset="0"/>
-              </a:rPr>
-              <a:t>.</a:t>
+              <a:t>DLF, LLS and WF are only convergent only for uniform meshes. For non-uniform meshes they fail to provide convergent Hessian recovery.</a:t>
             </a:r>
           </a:p>
           <a:p>
@@ -8144,10 +8233,6 @@
               </a:rPr>
               <a:t>However, the relative error of DLF, LLS and WF is quite low, which can be sufficient for mesh adaptation because if is often unnecessary to compute the mesh to a very high accuracy for the approximation of function or solution of DE.</a:t>
             </a:r>
-            <a:endParaRPr lang="en-IN" sz="2200" dirty="0" smtClean="0">
-              <a:latin typeface="Times New Roman" panose="02020603050405020304" pitchFamily="18" charset="0"/>
-              <a:cs typeface="Times New Roman" panose="02020603050405020304" pitchFamily="18" charset="0"/>
-            </a:endParaRPr>
           </a:p>
           <a:p>
             <a:endParaRPr lang="en-IN" sz="2200" dirty="0"/>
@@ -8203,14 +8288,22 @@
         </p:nvSpPr>
         <p:spPr/>
         <p:txBody>
-          <a:bodyPr/>
-          <a:lstStyle/>
-          <a:p>
-            <a:r>
-              <a:rPr lang="en-IN" dirty="0" smtClean="0"/>
-              <a:t>References</a:t>
-            </a:r>
-            <a:endParaRPr lang="en-IN" dirty="0"/>
+          <a:bodyPr>
+            <a:normAutofit/>
+          </a:bodyPr>
+          <a:lstStyle/>
+          <a:p>
+            <a:r>
+              <a:rPr lang="en-IN" sz="3200" b="1" dirty="0" smtClean="0">
+                <a:latin typeface="Times New Roman" panose="02020603050405020304" pitchFamily="18" charset="0"/>
+                <a:cs typeface="Times New Roman" panose="02020603050405020304" pitchFamily="18" charset="0"/>
+              </a:rPr>
+              <a:t>References:</a:t>
+            </a:r>
+            <a:endParaRPr lang="en-IN" sz="3200" b="1" dirty="0">
+              <a:latin typeface="Times New Roman" panose="02020603050405020304" pitchFamily="18" charset="0"/>
+              <a:cs typeface="Times New Roman" panose="02020603050405020304" pitchFamily="18" charset="0"/>
+            </a:endParaRPr>
           </a:p>
         </p:txBody>
       </p:sp>
@@ -8226,7 +8319,9 @@
         </p:nvSpPr>
         <p:spPr/>
         <p:txBody>
-          <a:bodyPr/>
+          <a:bodyPr>
+            <a:normAutofit/>
+          </a:bodyPr>
           <a:lstStyle/>
           <a:p>
             <a:pPr marL="514350" indent="-514350">
@@ -8234,8 +8329,18 @@
               <a:buAutoNum type="arabicPeriod"/>
             </a:pPr>
             <a:r>
-              <a:rPr lang="en-IN" dirty="0" smtClean="0"/>
-              <a:t>On Hessian Recovery and Anisotropic Adaptivity.</a:t>
+              <a:rPr lang="en-IN" dirty="0" smtClean="0">
+                <a:latin typeface="Times New Roman" panose="02020603050405020304" pitchFamily="18" charset="0"/>
+                <a:cs typeface="Times New Roman" panose="02020603050405020304" pitchFamily="18" charset="0"/>
+              </a:rPr>
+              <a:t>On Hessian Recovery and Anisotropic Adaptivity</a:t>
+            </a:r>
+            <a:r>
+              <a:rPr lang="en-IN" dirty="0" smtClean="0">
+                <a:latin typeface="Times New Roman" panose="02020603050405020304" pitchFamily="18" charset="0"/>
+                <a:cs typeface="Times New Roman" panose="02020603050405020304" pitchFamily="18" charset="0"/>
+              </a:rPr>
+              <a:t>.</a:t>
             </a:r>
           </a:p>
           <a:p>
@@ -8243,7 +8348,27 @@
               <a:buFont typeface="+mj-lt"/>
               <a:buAutoNum type="arabicPeriod"/>
             </a:pPr>
-            <a:endParaRPr lang="en-IN" dirty="0"/>
+            <a:r>
+              <a:rPr lang="en-IN" dirty="0" smtClean="0">
+                <a:latin typeface="Times New Roman" panose="02020603050405020304" pitchFamily="18" charset="0"/>
+                <a:cs typeface="Times New Roman" panose="02020603050405020304" pitchFamily="18" charset="0"/>
+              </a:rPr>
+              <a:t>Anisotropic Mesh Adaptation Based on Hessian recovery and a posteriori error estimates.</a:t>
+            </a:r>
+            <a:endParaRPr lang="en-IN" dirty="0" smtClean="0">
+              <a:latin typeface="Times New Roman" panose="02020603050405020304" pitchFamily="18" charset="0"/>
+              <a:cs typeface="Times New Roman" panose="02020603050405020304" pitchFamily="18" charset="0"/>
+            </a:endParaRPr>
+          </a:p>
+          <a:p>
+            <a:pPr marL="514350" indent="-514350">
+              <a:buFont typeface="+mj-lt"/>
+              <a:buAutoNum type="arabicPeriod"/>
+            </a:pPr>
+            <a:endParaRPr lang="en-IN" dirty="0">
+              <a:latin typeface="Times New Roman" panose="02020603050405020304" pitchFamily="18" charset="0"/>
+              <a:cs typeface="Times New Roman" panose="02020603050405020304" pitchFamily="18" charset="0"/>
+            </a:endParaRPr>
           </a:p>
         </p:txBody>
       </p:sp>
@@ -8356,14 +8481,7 @@
                 <a:latin typeface="Times New Roman" panose="02020603050405020304" pitchFamily="18" charset="0"/>
                 <a:cs typeface="Times New Roman" panose="02020603050405020304" pitchFamily="18" charset="0"/>
               </a:rPr>
-              <a:t>QLS</a:t>
-            </a:r>
-            <a:r>
-              <a:rPr lang="en-IN" dirty="0" smtClean="0">
-                <a:latin typeface="Times New Roman" panose="02020603050405020304" pitchFamily="18" charset="0"/>
-                <a:cs typeface="Times New Roman" panose="02020603050405020304" pitchFamily="18" charset="0"/>
-              </a:rPr>
-              <a:t>: Quadratic least squares fitting.</a:t>
+              <a:t>QLS: Quadratic least squares fitting.</a:t>
             </a:r>
           </a:p>
           <a:p>
@@ -8556,19 +8674,8 @@
                 <a:latin typeface="Times New Roman" panose="02020603050405020304" pitchFamily="18" charset="0"/>
                 <a:cs typeface="Times New Roman" panose="02020603050405020304" pitchFamily="18" charset="0"/>
               </a:rPr>
-              <a:t>diﬀerentiation</a:t>
-            </a:r>
-            <a:r>
-              <a:rPr lang="en-IN" dirty="0" smtClean="0">
-                <a:latin typeface="Times New Roman" panose="02020603050405020304" pitchFamily="18" charset="0"/>
-                <a:cs typeface="Times New Roman" panose="02020603050405020304" pitchFamily="18" charset="0"/>
-              </a:rPr>
-              <a:t>. First the input data is smoothed using quadratic regression, then the differentiation is applied.</a:t>
-            </a:r>
-            <a:endParaRPr lang="en-IN" dirty="0" smtClean="0">
-              <a:latin typeface="Times New Roman" panose="02020603050405020304" pitchFamily="18" charset="0"/>
-              <a:cs typeface="Times New Roman" panose="02020603050405020304" pitchFamily="18" charset="0"/>
-            </a:endParaRPr>
+              <a:t>diﬀerentiation. First the input data is smoothed using quadratic regression, then the differentiation is applied.</a:t>
+            </a:r>
           </a:p>
           <a:p>
             <a:pPr lvl="1"/>
@@ -8769,158 +8876,160 @@
           </a:xfrm>
         </p:spPr>
         <p:txBody>
-          <a:bodyPr/>
-          <a:lstStyle/>
-          <a:p>
-            <a:r>
-              <a:rPr lang="en-IN" dirty="0" smtClean="0">
+          <a:bodyPr>
+            <a:normAutofit/>
+          </a:bodyPr>
+          <a:lstStyle/>
+          <a:p>
+            <a:r>
+              <a:rPr lang="en-IN" sz="2400" dirty="0" smtClean="0">
                 <a:latin typeface="Times New Roman" panose="02020603050405020304" pitchFamily="18" charset="0"/>
                 <a:cs typeface="Times New Roman" panose="02020603050405020304" pitchFamily="18" charset="0"/>
               </a:rPr>
               <a:t>Node </a:t>
             </a:r>
             <a:r>
-              <a:rPr lang="en-IN" i="1" dirty="0" smtClean="0">
+              <a:rPr lang="en-IN" sz="2400" i="1" dirty="0" smtClean="0">
                 <a:latin typeface="Times New Roman" panose="02020603050405020304" pitchFamily="18" charset="0"/>
                 <a:cs typeface="Times New Roman" panose="02020603050405020304" pitchFamily="18" charset="0"/>
               </a:rPr>
               <a:t>N</a:t>
             </a:r>
             <a:r>
-              <a:rPr lang="en-IN" i="1" baseline="-25000" dirty="0" smtClean="0">
+              <a:rPr lang="en-IN" sz="2400" i="1" baseline="-25000" dirty="0" smtClean="0">
                 <a:latin typeface="Times New Roman" panose="02020603050405020304" pitchFamily="18" charset="0"/>
                 <a:cs typeface="Times New Roman" panose="02020603050405020304" pitchFamily="18" charset="0"/>
               </a:rPr>
               <a:t>0</a:t>
             </a:r>
             <a:r>
-              <a:rPr lang="en-IN" dirty="0" smtClean="0">
+              <a:rPr lang="en-IN" sz="2400" dirty="0" smtClean="0">
                 <a:latin typeface="Times New Roman" panose="02020603050405020304" pitchFamily="18" charset="0"/>
                 <a:cs typeface="Times New Roman" panose="02020603050405020304" pitchFamily="18" charset="0"/>
               </a:rPr>
               <a:t>(</a:t>
             </a:r>
             <a:r>
-              <a:rPr lang="en-IN" i="1" dirty="0" smtClean="0">
+              <a:rPr lang="en-IN" sz="2400" i="1" dirty="0" smtClean="0">
                 <a:latin typeface="Times New Roman" panose="02020603050405020304" pitchFamily="18" charset="0"/>
                 <a:cs typeface="Times New Roman" panose="02020603050405020304" pitchFamily="18" charset="0"/>
               </a:rPr>
               <a:t>x</a:t>
             </a:r>
             <a:r>
-              <a:rPr lang="en-IN" i="1" baseline="-25000" dirty="0" smtClean="0">
+              <a:rPr lang="en-IN" sz="2400" i="1" baseline="-25000" dirty="0" smtClean="0">
                 <a:latin typeface="Times New Roman" panose="02020603050405020304" pitchFamily="18" charset="0"/>
                 <a:cs typeface="Times New Roman" panose="02020603050405020304" pitchFamily="18" charset="0"/>
               </a:rPr>
               <a:t>0</a:t>
             </a:r>
             <a:r>
-              <a:rPr lang="en-IN" i="1" dirty="0" smtClean="0">
+              <a:rPr lang="en-IN" sz="2400" i="1" dirty="0" smtClean="0">
                 <a:latin typeface="Times New Roman" panose="02020603050405020304" pitchFamily="18" charset="0"/>
                 <a:cs typeface="Times New Roman" panose="02020603050405020304" pitchFamily="18" charset="0"/>
               </a:rPr>
               <a:t>,y</a:t>
             </a:r>
             <a:r>
-              <a:rPr lang="en-IN" i="1" baseline="-25000" dirty="0" smtClean="0">
+              <a:rPr lang="en-IN" sz="2400" i="1" baseline="-25000" dirty="0" smtClean="0">
                 <a:latin typeface="Times New Roman" panose="02020603050405020304" pitchFamily="18" charset="0"/>
                 <a:cs typeface="Times New Roman" panose="02020603050405020304" pitchFamily="18" charset="0"/>
               </a:rPr>
               <a:t>0</a:t>
             </a:r>
             <a:r>
-              <a:rPr lang="en-IN" dirty="0" smtClean="0">
+              <a:rPr lang="en-IN" sz="2400" dirty="0" smtClean="0">
                 <a:latin typeface="Times New Roman" panose="02020603050405020304" pitchFamily="18" charset="0"/>
                 <a:cs typeface="Times New Roman" panose="02020603050405020304" pitchFamily="18" charset="0"/>
               </a:rPr>
               <a:t>), patch is rep as </a:t>
             </a:r>
             <a:r>
-              <a:rPr lang="en-IN" i="1" dirty="0" smtClean="0">
+              <a:rPr lang="en-IN" sz="2400" i="1" dirty="0" smtClean="0">
                 <a:latin typeface="Times New Roman" panose="02020603050405020304" pitchFamily="18" charset="0"/>
                 <a:cs typeface="Times New Roman" panose="02020603050405020304" pitchFamily="18" charset="0"/>
               </a:rPr>
               <a:t>N</a:t>
             </a:r>
             <a:r>
-              <a:rPr lang="en-IN" i="1" baseline="-25000" dirty="0" smtClean="0">
+              <a:rPr lang="en-IN" sz="2400" i="1" baseline="-25000" dirty="0" smtClean="0">
                 <a:latin typeface="Times New Roman" panose="02020603050405020304" pitchFamily="18" charset="0"/>
                 <a:cs typeface="Times New Roman" panose="02020603050405020304" pitchFamily="18" charset="0"/>
               </a:rPr>
               <a:t>i</a:t>
             </a:r>
             <a:r>
-              <a:rPr lang="en-IN" dirty="0" smtClean="0">
+              <a:rPr lang="en-IN" sz="2400" dirty="0" smtClean="0">
                 <a:latin typeface="Times New Roman" panose="02020603050405020304" pitchFamily="18" charset="0"/>
                 <a:cs typeface="Times New Roman" panose="02020603050405020304" pitchFamily="18" charset="0"/>
               </a:rPr>
               <a:t>(</a:t>
             </a:r>
             <a:r>
-              <a:rPr lang="en-IN" i="1" dirty="0" err="1" smtClean="0">
+              <a:rPr lang="en-IN" sz="2400" i="1" dirty="0" err="1" smtClean="0">
                 <a:latin typeface="Times New Roman" panose="02020603050405020304" pitchFamily="18" charset="0"/>
                 <a:cs typeface="Times New Roman" panose="02020603050405020304" pitchFamily="18" charset="0"/>
               </a:rPr>
               <a:t>x</a:t>
             </a:r>
             <a:r>
-              <a:rPr lang="en-IN" i="1" baseline="-25000" dirty="0" err="1" smtClean="0">
+              <a:rPr lang="en-IN" sz="2400" i="1" baseline="-25000" dirty="0" err="1" smtClean="0">
                 <a:latin typeface="Times New Roman" panose="02020603050405020304" pitchFamily="18" charset="0"/>
                 <a:cs typeface="Times New Roman" panose="02020603050405020304" pitchFamily="18" charset="0"/>
               </a:rPr>
               <a:t>i</a:t>
             </a:r>
             <a:r>
-              <a:rPr lang="en-IN" i="1" dirty="0" err="1" smtClean="0">
+              <a:rPr lang="en-IN" sz="2400" i="1" dirty="0" err="1" smtClean="0">
                 <a:latin typeface="Times New Roman" panose="02020603050405020304" pitchFamily="18" charset="0"/>
                 <a:cs typeface="Times New Roman" panose="02020603050405020304" pitchFamily="18" charset="0"/>
               </a:rPr>
               <a:t>,y</a:t>
             </a:r>
             <a:r>
-              <a:rPr lang="en-IN" i="1" baseline="-25000" dirty="0" err="1" smtClean="0">
+              <a:rPr lang="en-IN" sz="2400" i="1" baseline="-25000" dirty="0" err="1" smtClean="0">
                 <a:latin typeface="Times New Roman" panose="02020603050405020304" pitchFamily="18" charset="0"/>
                 <a:cs typeface="Times New Roman" panose="02020603050405020304" pitchFamily="18" charset="0"/>
               </a:rPr>
               <a:t>i</a:t>
             </a:r>
             <a:r>
-              <a:rPr lang="en-IN" dirty="0" smtClean="0">
+              <a:rPr lang="en-IN" sz="2400" dirty="0" smtClean="0">
                 <a:latin typeface="Times New Roman" panose="02020603050405020304" pitchFamily="18" charset="0"/>
                 <a:cs typeface="Times New Roman" panose="02020603050405020304" pitchFamily="18" charset="0"/>
               </a:rPr>
               <a:t>) </a:t>
             </a:r>
             <a:r>
-              <a:rPr lang="en-IN" i="1" dirty="0" smtClean="0">
+              <a:rPr lang="en-IN" sz="2400" i="1" dirty="0" smtClean="0">
                 <a:latin typeface="Times New Roman" panose="02020603050405020304" pitchFamily="18" charset="0"/>
                 <a:cs typeface="Times New Roman" panose="02020603050405020304" pitchFamily="18" charset="0"/>
               </a:rPr>
               <a:t>i</a:t>
             </a:r>
             <a:r>
-              <a:rPr lang="en-IN" dirty="0" smtClean="0">
+              <a:rPr lang="en-IN" sz="2400" dirty="0" smtClean="0">
                 <a:latin typeface="Times New Roman" panose="02020603050405020304" pitchFamily="18" charset="0"/>
                 <a:cs typeface="Times New Roman" panose="02020603050405020304" pitchFamily="18" charset="0"/>
               </a:rPr>
               <a:t>=1,2,..</a:t>
             </a:r>
             <a:r>
-              <a:rPr lang="en-IN" i="1" dirty="0" smtClean="0">
+              <a:rPr lang="en-IN" sz="2400" i="1" dirty="0" smtClean="0">
                 <a:latin typeface="Times New Roman" panose="02020603050405020304" pitchFamily="18" charset="0"/>
                 <a:cs typeface="Times New Roman" panose="02020603050405020304" pitchFamily="18" charset="0"/>
               </a:rPr>
               <a:t>n</a:t>
             </a:r>
             <a:r>
-              <a:rPr lang="en-IN" dirty="0" smtClean="0">
+              <a:rPr lang="en-IN" sz="2400" dirty="0" smtClean="0">
                 <a:latin typeface="Times New Roman" panose="02020603050405020304" pitchFamily="18" charset="0"/>
                 <a:cs typeface="Times New Roman" panose="02020603050405020304" pitchFamily="18" charset="0"/>
               </a:rPr>
               <a:t> for </a:t>
             </a:r>
             <a:r>
-              <a:rPr lang="en-IN" i="1" dirty="0" smtClean="0">
+              <a:rPr lang="en-IN" sz="2400" i="1" dirty="0" smtClean="0">
                 <a:latin typeface="Times New Roman" panose="02020603050405020304" pitchFamily="18" charset="0"/>
                 <a:cs typeface="Times New Roman" panose="02020603050405020304" pitchFamily="18" charset="0"/>
               </a:rPr>
@@ -8931,515 +9040,531 @@
                 <a:latin typeface="Times New Roman" panose="02020603050405020304" pitchFamily="18" charset="0"/>
                 <a:cs typeface="Times New Roman" panose="02020603050405020304" pitchFamily="18" charset="0"/>
               </a:rPr>
-              <a:t>≥</a:t>
-            </a:r>
-            <a:r>
-              <a:rPr lang="en-IN" dirty="0" smtClean="0">
+              <a:t>≥ 5. </a:t>
+            </a:r>
+          </a:p>
+          <a:p>
+            <a:r>
+              <a:rPr lang="en-IN" sz="2400" i="1" dirty="0">
+                <a:latin typeface="Times New Roman" panose="02020603050405020304" pitchFamily="18" charset="0"/>
+                <a:cs typeface="Times New Roman" panose="02020603050405020304" pitchFamily="18" charset="0"/>
+              </a:rPr>
+              <a:t>u</a:t>
+            </a:r>
+            <a:r>
+              <a:rPr lang="en-IN" sz="2400" i="1" baseline="-25000" dirty="0" smtClean="0">
+                <a:latin typeface="Times New Roman" panose="02020603050405020304" pitchFamily="18" charset="0"/>
+                <a:cs typeface="Times New Roman" panose="02020603050405020304" pitchFamily="18" charset="0"/>
+              </a:rPr>
+              <a:t>h</a:t>
+            </a:r>
+            <a:r>
+              <a:rPr lang="en-IN" sz="2400" dirty="0" smtClean="0">
+                <a:latin typeface="Times New Roman" panose="02020603050405020304" pitchFamily="18" charset="0"/>
+                <a:cs typeface="Times New Roman" panose="02020603050405020304" pitchFamily="18" charset="0"/>
+              </a:rPr>
+              <a:t>-approximated function. </a:t>
+            </a:r>
+          </a:p>
+          <a:p>
+            <a:r>
+              <a:rPr lang="en-IN" sz="2400" dirty="0" smtClean="0">
+                <a:latin typeface="Times New Roman" panose="02020603050405020304" pitchFamily="18" charset="0"/>
+                <a:cs typeface="Times New Roman" panose="02020603050405020304" pitchFamily="18" charset="0"/>
+              </a:rPr>
+              <a:t>Polynomial p</a:t>
+            </a:r>
+            <a:r>
+              <a:rPr lang="en-IN" sz="2400" baseline="-25000" dirty="0" smtClean="0">
+                <a:latin typeface="Times New Roman" panose="02020603050405020304" pitchFamily="18" charset="0"/>
+                <a:cs typeface="Times New Roman" panose="02020603050405020304" pitchFamily="18" charset="0"/>
+              </a:rPr>
+              <a:t>2</a:t>
+            </a:r>
+            <a:r>
+              <a:rPr lang="en-IN" sz="2400" dirty="0" smtClean="0">
+                <a:latin typeface="Times New Roman" panose="02020603050405020304" pitchFamily="18" charset="0"/>
+                <a:cs typeface="Times New Roman" panose="02020603050405020304" pitchFamily="18" charset="0"/>
+              </a:rPr>
+              <a:t>:  </a:t>
+            </a:r>
+            <a:r>
+              <a:rPr lang="en-IN" sz="2400" b="1" dirty="0">
+                <a:latin typeface="Times New Roman" panose="02020603050405020304" pitchFamily="18" charset="0"/>
+                <a:cs typeface="Times New Roman" panose="02020603050405020304" pitchFamily="18" charset="0"/>
+              </a:rPr>
+              <a:t>p</a:t>
+            </a:r>
+            <a:r>
+              <a:rPr lang="en-IN" sz="2400" b="1" baseline="-25000" dirty="0" smtClean="0">
+                <a:latin typeface="Times New Roman" panose="02020603050405020304" pitchFamily="18" charset="0"/>
+                <a:cs typeface="Times New Roman" panose="02020603050405020304" pitchFamily="18" charset="0"/>
+              </a:rPr>
+              <a:t>2 </a:t>
+            </a:r>
+            <a:r>
+              <a:rPr lang="en-IN" sz="2400" b="1" dirty="0" smtClean="0">
+                <a:latin typeface="Times New Roman" panose="02020603050405020304" pitchFamily="18" charset="0"/>
+                <a:cs typeface="Times New Roman" panose="02020603050405020304" pitchFamily="18" charset="0"/>
+              </a:rPr>
+              <a:t>(</a:t>
+            </a:r>
+            <a:r>
+              <a:rPr lang="en-IN" sz="2400" b="1" i="1" dirty="0" smtClean="0">
+                <a:latin typeface="Times New Roman" panose="02020603050405020304" pitchFamily="18" charset="0"/>
+                <a:cs typeface="Times New Roman" panose="02020603050405020304" pitchFamily="18" charset="0"/>
+              </a:rPr>
+              <a:t>x,y</a:t>
+            </a:r>
+            <a:r>
+              <a:rPr lang="en-IN" sz="2400" b="1" dirty="0" smtClean="0">
+                <a:latin typeface="Times New Roman" panose="02020603050405020304" pitchFamily="18" charset="0"/>
+                <a:cs typeface="Times New Roman" panose="02020603050405020304" pitchFamily="18" charset="0"/>
+              </a:rPr>
+              <a:t>;</a:t>
+            </a:r>
+            <a:r>
+              <a:rPr lang="en-IN" sz="2400" b="1" i="1" dirty="0" smtClean="0">
+                <a:latin typeface="Times New Roman" panose="02020603050405020304" pitchFamily="18" charset="0"/>
+                <a:cs typeface="Times New Roman" panose="02020603050405020304" pitchFamily="18" charset="0"/>
+              </a:rPr>
+              <a:t>N</a:t>
+            </a:r>
+            <a:r>
+              <a:rPr lang="en-IN" sz="2400" b="1" i="1" baseline="-25000" dirty="0" smtClean="0">
+                <a:latin typeface="Times New Roman" panose="02020603050405020304" pitchFamily="18" charset="0"/>
+                <a:cs typeface="Times New Roman" panose="02020603050405020304" pitchFamily="18" charset="0"/>
+              </a:rPr>
+              <a:t>0</a:t>
+            </a:r>
+            <a:r>
+              <a:rPr lang="en-IN" sz="2400" b="1" dirty="0" smtClean="0">
+                <a:latin typeface="Times New Roman" panose="02020603050405020304" pitchFamily="18" charset="0"/>
+                <a:cs typeface="Times New Roman" panose="02020603050405020304" pitchFamily="18" charset="0"/>
+              </a:rPr>
+              <a:t>)=</a:t>
+            </a:r>
+            <a:r>
+              <a:rPr lang="en-IN" sz="2400" b="1" i="1" dirty="0" smtClean="0">
+                <a:latin typeface="Times New Roman" panose="02020603050405020304" pitchFamily="18" charset="0"/>
+                <a:cs typeface="Times New Roman" panose="02020603050405020304" pitchFamily="18" charset="0"/>
+              </a:rPr>
+              <a:t>a</a:t>
+            </a:r>
+            <a:r>
+              <a:rPr lang="en-IN" sz="2400" b="1" i="1" baseline="-25000" dirty="0" smtClean="0">
+                <a:latin typeface="Times New Roman" panose="02020603050405020304" pitchFamily="18" charset="0"/>
+                <a:cs typeface="Times New Roman" panose="02020603050405020304" pitchFamily="18" charset="0"/>
+              </a:rPr>
+              <a:t>1</a:t>
+            </a:r>
+            <a:r>
+              <a:rPr lang="en-IN" sz="2400" b="1" dirty="0" smtClean="0">
+                <a:latin typeface="Times New Roman" panose="02020603050405020304" pitchFamily="18" charset="0"/>
+                <a:cs typeface="Times New Roman" panose="02020603050405020304" pitchFamily="18" charset="0"/>
+              </a:rPr>
+              <a:t>+</a:t>
+            </a:r>
+            <a:r>
+              <a:rPr lang="en-IN" sz="2400" b="1" i="1" dirty="0" smtClean="0">
+                <a:latin typeface="Times New Roman" panose="02020603050405020304" pitchFamily="18" charset="0"/>
+                <a:cs typeface="Times New Roman" panose="02020603050405020304" pitchFamily="18" charset="0"/>
+              </a:rPr>
+              <a:t>a</a:t>
+            </a:r>
+            <a:r>
+              <a:rPr lang="en-IN" sz="2400" b="1" i="1" baseline="-25000" dirty="0" smtClean="0">
+                <a:latin typeface="Times New Roman" panose="02020603050405020304" pitchFamily="18" charset="0"/>
+                <a:cs typeface="Times New Roman" panose="02020603050405020304" pitchFamily="18" charset="0"/>
+              </a:rPr>
+              <a:t>2</a:t>
+            </a:r>
+            <a:r>
+              <a:rPr lang="en-IN" sz="2400" b="1" i="1" dirty="0" smtClean="0">
+                <a:latin typeface="Times New Roman" panose="02020603050405020304" pitchFamily="18" charset="0"/>
+                <a:cs typeface="Times New Roman" panose="02020603050405020304" pitchFamily="18" charset="0"/>
+              </a:rPr>
+              <a:t>x</a:t>
+            </a:r>
+            <a:r>
+              <a:rPr lang="en-IN" sz="2400" b="1" dirty="0" smtClean="0">
+                <a:latin typeface="Times New Roman" panose="02020603050405020304" pitchFamily="18" charset="0"/>
+                <a:cs typeface="Times New Roman" panose="02020603050405020304" pitchFamily="18" charset="0"/>
+              </a:rPr>
+              <a:t>+</a:t>
+            </a:r>
+            <a:r>
+              <a:rPr lang="en-IN" sz="2400" b="1" i="1" dirty="0" smtClean="0">
+                <a:latin typeface="Times New Roman" panose="02020603050405020304" pitchFamily="18" charset="0"/>
+                <a:cs typeface="Times New Roman" panose="02020603050405020304" pitchFamily="18" charset="0"/>
+              </a:rPr>
+              <a:t>a</a:t>
+            </a:r>
+            <a:r>
+              <a:rPr lang="en-IN" sz="2400" b="1" i="1" baseline="-25000" dirty="0" smtClean="0">
+                <a:latin typeface="Times New Roman" panose="02020603050405020304" pitchFamily="18" charset="0"/>
+                <a:cs typeface="Times New Roman" panose="02020603050405020304" pitchFamily="18" charset="0"/>
+              </a:rPr>
+              <a:t>3</a:t>
+            </a:r>
+            <a:r>
+              <a:rPr lang="en-IN" sz="2400" b="1" i="1" dirty="0" smtClean="0">
+                <a:latin typeface="Times New Roman" panose="02020603050405020304" pitchFamily="18" charset="0"/>
+                <a:cs typeface="Times New Roman" panose="02020603050405020304" pitchFamily="18" charset="0"/>
+              </a:rPr>
+              <a:t>y</a:t>
+            </a:r>
+            <a:r>
+              <a:rPr lang="en-IN" sz="2400" b="1" dirty="0" smtClean="0">
+                <a:latin typeface="Times New Roman" panose="02020603050405020304" pitchFamily="18" charset="0"/>
+                <a:cs typeface="Times New Roman" panose="02020603050405020304" pitchFamily="18" charset="0"/>
+              </a:rPr>
+              <a:t>+</a:t>
+            </a:r>
+            <a:r>
+              <a:rPr lang="en-IN" sz="2400" b="1" i="1" dirty="0" smtClean="0">
+                <a:latin typeface="Times New Roman" panose="02020603050405020304" pitchFamily="18" charset="0"/>
+                <a:cs typeface="Times New Roman" panose="02020603050405020304" pitchFamily="18" charset="0"/>
+              </a:rPr>
+              <a:t>a</a:t>
+            </a:r>
+            <a:r>
+              <a:rPr lang="en-IN" sz="2400" b="1" i="1" baseline="-25000" dirty="0" smtClean="0">
+                <a:latin typeface="Times New Roman" panose="02020603050405020304" pitchFamily="18" charset="0"/>
+                <a:cs typeface="Times New Roman" panose="02020603050405020304" pitchFamily="18" charset="0"/>
+              </a:rPr>
+              <a:t>4</a:t>
+            </a:r>
+            <a:r>
+              <a:rPr lang="en-IN" sz="2400" b="1" i="1" dirty="0" smtClean="0">
+                <a:latin typeface="Times New Roman" panose="02020603050405020304" pitchFamily="18" charset="0"/>
+                <a:cs typeface="Times New Roman" panose="02020603050405020304" pitchFamily="18" charset="0"/>
+              </a:rPr>
+              <a:t>xy</a:t>
+            </a:r>
+            <a:r>
+              <a:rPr lang="en-IN" sz="2400" b="1" dirty="0" smtClean="0">
+                <a:latin typeface="Times New Roman" panose="02020603050405020304" pitchFamily="18" charset="0"/>
+                <a:cs typeface="Times New Roman" panose="02020603050405020304" pitchFamily="18" charset="0"/>
+              </a:rPr>
+              <a:t>+</a:t>
+            </a:r>
+            <a:r>
+              <a:rPr lang="en-IN" sz="2400" b="1" i="1" dirty="0" smtClean="0">
+                <a:latin typeface="Times New Roman" panose="02020603050405020304" pitchFamily="18" charset="0"/>
+                <a:cs typeface="Times New Roman" panose="02020603050405020304" pitchFamily="18" charset="0"/>
+              </a:rPr>
+              <a:t>a</a:t>
+            </a:r>
+            <a:r>
+              <a:rPr lang="en-IN" sz="2400" b="1" i="1" baseline="-25000" dirty="0" smtClean="0">
+                <a:latin typeface="Times New Roman" panose="02020603050405020304" pitchFamily="18" charset="0"/>
+                <a:cs typeface="Times New Roman" panose="02020603050405020304" pitchFamily="18" charset="0"/>
+              </a:rPr>
+              <a:t>5</a:t>
+            </a:r>
+            <a:r>
+              <a:rPr lang="en-IN" sz="2400" b="1" i="1" dirty="0" smtClean="0">
+                <a:latin typeface="Times New Roman" panose="02020603050405020304" pitchFamily="18" charset="0"/>
+                <a:cs typeface="Times New Roman" panose="02020603050405020304" pitchFamily="18" charset="0"/>
+              </a:rPr>
+              <a:t>x</a:t>
+            </a:r>
+            <a:r>
+              <a:rPr lang="en-IN" sz="2400" b="1" i="1" baseline="30000" dirty="0" smtClean="0">
+                <a:latin typeface="Times New Roman" panose="02020603050405020304" pitchFamily="18" charset="0"/>
+                <a:cs typeface="Times New Roman" panose="02020603050405020304" pitchFamily="18" charset="0"/>
+              </a:rPr>
+              <a:t>2</a:t>
+            </a:r>
+            <a:r>
+              <a:rPr lang="en-IN" sz="2400" b="1" dirty="0" smtClean="0">
+                <a:latin typeface="Times New Roman" panose="02020603050405020304" pitchFamily="18" charset="0"/>
+                <a:cs typeface="Times New Roman" panose="02020603050405020304" pitchFamily="18" charset="0"/>
+              </a:rPr>
+              <a:t>+</a:t>
+            </a:r>
+            <a:r>
+              <a:rPr lang="en-IN" sz="2400" b="1" i="1" dirty="0" smtClean="0">
+                <a:latin typeface="Times New Roman" panose="02020603050405020304" pitchFamily="18" charset="0"/>
+                <a:cs typeface="Times New Roman" panose="02020603050405020304" pitchFamily="18" charset="0"/>
+              </a:rPr>
+              <a:t>a</a:t>
+            </a:r>
+            <a:r>
+              <a:rPr lang="en-IN" sz="2400" b="1" i="1" baseline="-25000" dirty="0" smtClean="0">
+                <a:latin typeface="Times New Roman" panose="02020603050405020304" pitchFamily="18" charset="0"/>
+                <a:cs typeface="Times New Roman" panose="02020603050405020304" pitchFamily="18" charset="0"/>
+              </a:rPr>
+              <a:t>6</a:t>
+            </a:r>
+            <a:r>
+              <a:rPr lang="en-IN" sz="2400" b="1" i="1" dirty="0" smtClean="0">
+                <a:latin typeface="Times New Roman" panose="02020603050405020304" pitchFamily="18" charset="0"/>
+                <a:cs typeface="Times New Roman" panose="02020603050405020304" pitchFamily="18" charset="0"/>
+              </a:rPr>
+              <a:t>y</a:t>
+            </a:r>
+            <a:r>
+              <a:rPr lang="en-IN" sz="2400" b="1" i="1" baseline="30000" dirty="0" smtClean="0">
+                <a:latin typeface="Times New Roman" panose="02020603050405020304" pitchFamily="18" charset="0"/>
+                <a:cs typeface="Times New Roman" panose="02020603050405020304" pitchFamily="18" charset="0"/>
+              </a:rPr>
+              <a:t>2</a:t>
+            </a:r>
+          </a:p>
+          <a:p>
+            <a:r>
+              <a:rPr lang="en-IN" sz="2400" dirty="0" err="1" smtClean="0">
+                <a:latin typeface="Times New Roman" panose="02020603050405020304" pitchFamily="18" charset="0"/>
+                <a:cs typeface="Times New Roman" panose="02020603050405020304" pitchFamily="18" charset="0"/>
+              </a:rPr>
+              <a:t>Coeff</a:t>
+            </a:r>
+            <a:r>
+              <a:rPr lang="en-IN" sz="2400" dirty="0" smtClean="0">
+                <a:latin typeface="Times New Roman" panose="02020603050405020304" pitchFamily="18" charset="0"/>
+                <a:cs typeface="Times New Roman" panose="02020603050405020304" pitchFamily="18" charset="0"/>
+              </a:rPr>
+              <a:t>. vector </a:t>
+            </a:r>
+            <a:r>
+              <a:rPr lang="en-IN" sz="2400" i="1" dirty="0" smtClean="0">
+                <a:latin typeface="Times New Roman" panose="02020603050405020304" pitchFamily="18" charset="0"/>
+                <a:cs typeface="Times New Roman" panose="02020603050405020304" pitchFamily="18" charset="0"/>
+              </a:rPr>
+              <a:t>a</a:t>
+            </a:r>
+            <a:r>
+              <a:rPr lang="en-IN" sz="2400" dirty="0" smtClean="0">
+                <a:latin typeface="Times New Roman" panose="02020603050405020304" pitchFamily="18" charset="0"/>
+                <a:cs typeface="Times New Roman" panose="02020603050405020304" pitchFamily="18" charset="0"/>
+              </a:rPr>
+              <a:t>=(</a:t>
+            </a:r>
+            <a:r>
+              <a:rPr lang="en-IN" sz="2400" i="1" dirty="0" smtClean="0">
+                <a:latin typeface="Times New Roman" panose="02020603050405020304" pitchFamily="18" charset="0"/>
+                <a:cs typeface="Times New Roman" panose="02020603050405020304" pitchFamily="18" charset="0"/>
+              </a:rPr>
+              <a:t>a</a:t>
+            </a:r>
+            <a:r>
+              <a:rPr lang="en-IN" sz="2400" i="1" baseline="-25000" dirty="0" smtClean="0">
+                <a:latin typeface="Times New Roman" panose="02020603050405020304" pitchFamily="18" charset="0"/>
+                <a:cs typeface="Times New Roman" panose="02020603050405020304" pitchFamily="18" charset="0"/>
+              </a:rPr>
+              <a:t>1</a:t>
+            </a:r>
+            <a:r>
+              <a:rPr lang="en-IN" sz="2400" i="1" dirty="0">
                 <a:latin typeface="Times New Roman" panose="02020603050405020304" pitchFamily="18" charset="0"/>
                 <a:cs typeface="Times New Roman" panose="02020603050405020304" pitchFamily="18" charset="0"/>
               </a:rPr>
               <a:t> </a:t>
             </a:r>
             <a:r>
-              <a:rPr lang="en-IN" dirty="0" smtClean="0">
+              <a:rPr lang="en-IN" sz="2400" i="1" dirty="0" smtClean="0">
+                <a:latin typeface="Times New Roman" panose="02020603050405020304" pitchFamily="18" charset="0"/>
+                <a:cs typeface="Times New Roman" panose="02020603050405020304" pitchFamily="18" charset="0"/>
+              </a:rPr>
+              <a:t>a</a:t>
+            </a:r>
+            <a:r>
+              <a:rPr lang="en-IN" sz="2400" i="1" baseline="-25000" dirty="0" smtClean="0">
+                <a:latin typeface="Times New Roman" panose="02020603050405020304" pitchFamily="18" charset="0"/>
+                <a:cs typeface="Times New Roman" panose="02020603050405020304" pitchFamily="18" charset="0"/>
+              </a:rPr>
+              <a:t>2</a:t>
+            </a:r>
+            <a:r>
+              <a:rPr lang="en-IN" sz="2400" i="1" dirty="0">
+                <a:latin typeface="Times New Roman" panose="02020603050405020304" pitchFamily="18" charset="0"/>
+                <a:cs typeface="Times New Roman" panose="02020603050405020304" pitchFamily="18" charset="0"/>
+              </a:rPr>
+              <a:t> </a:t>
+            </a:r>
+            <a:r>
+              <a:rPr lang="en-IN" sz="2400" i="1" dirty="0" smtClean="0">
+                <a:latin typeface="Times New Roman" panose="02020603050405020304" pitchFamily="18" charset="0"/>
+                <a:cs typeface="Times New Roman" panose="02020603050405020304" pitchFamily="18" charset="0"/>
+              </a:rPr>
+              <a:t>a</a:t>
+            </a:r>
+            <a:r>
+              <a:rPr lang="en-IN" sz="2400" i="1" baseline="-25000" dirty="0" smtClean="0">
+                <a:latin typeface="Times New Roman" panose="02020603050405020304" pitchFamily="18" charset="0"/>
+                <a:cs typeface="Times New Roman" panose="02020603050405020304" pitchFamily="18" charset="0"/>
+              </a:rPr>
+              <a:t>3 </a:t>
+            </a:r>
+            <a:r>
+              <a:rPr lang="en-IN" sz="2400" i="1" dirty="0" smtClean="0">
+                <a:latin typeface="Times New Roman" panose="02020603050405020304" pitchFamily="18" charset="0"/>
+                <a:cs typeface="Times New Roman" panose="02020603050405020304" pitchFamily="18" charset="0"/>
+              </a:rPr>
+              <a:t>a</a:t>
+            </a:r>
+            <a:r>
+              <a:rPr lang="en-IN" sz="2400" i="1" baseline="-25000" dirty="0" smtClean="0">
+                <a:latin typeface="Times New Roman" panose="02020603050405020304" pitchFamily="18" charset="0"/>
+                <a:cs typeface="Times New Roman" panose="02020603050405020304" pitchFamily="18" charset="0"/>
+              </a:rPr>
+              <a:t>4</a:t>
+            </a:r>
+            <a:r>
+              <a:rPr lang="en-IN" sz="2400" i="1" dirty="0">
+                <a:latin typeface="Times New Roman" panose="02020603050405020304" pitchFamily="18" charset="0"/>
+                <a:cs typeface="Times New Roman" panose="02020603050405020304" pitchFamily="18" charset="0"/>
+              </a:rPr>
+              <a:t> </a:t>
+            </a:r>
+            <a:r>
+              <a:rPr lang="en-IN" sz="2400" i="1" dirty="0" smtClean="0">
+                <a:latin typeface="Times New Roman" panose="02020603050405020304" pitchFamily="18" charset="0"/>
+                <a:cs typeface="Times New Roman" panose="02020603050405020304" pitchFamily="18" charset="0"/>
+              </a:rPr>
+              <a:t>a</a:t>
+            </a:r>
+            <a:r>
+              <a:rPr lang="en-IN" sz="2400" i="1" baseline="-25000" dirty="0" smtClean="0">
                 <a:latin typeface="Times New Roman" panose="02020603050405020304" pitchFamily="18" charset="0"/>
                 <a:cs typeface="Times New Roman" panose="02020603050405020304" pitchFamily="18" charset="0"/>
               </a:rPr>
               <a:t>5</a:t>
             </a:r>
             <a:r>
-              <a:rPr lang="en-IN" dirty="0" smtClean="0">
-                <a:latin typeface="Times New Roman" panose="02020603050405020304" pitchFamily="18" charset="0"/>
-                <a:cs typeface="Times New Roman" panose="02020603050405020304" pitchFamily="18" charset="0"/>
-              </a:rPr>
-              <a:t>. </a:t>
-            </a:r>
-          </a:p>
-          <a:p>
-            <a:r>
-              <a:rPr lang="en-IN" i="1" dirty="0">
-                <a:latin typeface="Times New Roman" panose="02020603050405020304" pitchFamily="18" charset="0"/>
-                <a:cs typeface="Times New Roman" panose="02020603050405020304" pitchFamily="18" charset="0"/>
-              </a:rPr>
-              <a:t>u</a:t>
-            </a:r>
-            <a:r>
-              <a:rPr lang="en-IN" i="1" baseline="-25000" dirty="0" smtClean="0">
+              <a:rPr lang="en-IN" sz="2400" i="1" dirty="0">
+                <a:latin typeface="Times New Roman" panose="02020603050405020304" pitchFamily="18" charset="0"/>
+                <a:cs typeface="Times New Roman" panose="02020603050405020304" pitchFamily="18" charset="0"/>
+              </a:rPr>
+              <a:t> </a:t>
+            </a:r>
+            <a:r>
+              <a:rPr lang="en-IN" sz="2400" i="1" dirty="0" smtClean="0">
+                <a:latin typeface="Times New Roman" panose="02020603050405020304" pitchFamily="18" charset="0"/>
+                <a:cs typeface="Times New Roman" panose="02020603050405020304" pitchFamily="18" charset="0"/>
+              </a:rPr>
+              <a:t>a</a:t>
+            </a:r>
+            <a:r>
+              <a:rPr lang="en-IN" sz="2400" i="1" baseline="-25000" dirty="0" smtClean="0">
+                <a:latin typeface="Times New Roman" panose="02020603050405020304" pitchFamily="18" charset="0"/>
+                <a:cs typeface="Times New Roman" panose="02020603050405020304" pitchFamily="18" charset="0"/>
+              </a:rPr>
+              <a:t>6</a:t>
+            </a:r>
+            <a:r>
+              <a:rPr lang="en-IN" sz="2400" dirty="0" smtClean="0">
+                <a:latin typeface="Times New Roman" panose="02020603050405020304" pitchFamily="18" charset="0"/>
+                <a:cs typeface="Times New Roman" panose="02020603050405020304" pitchFamily="18" charset="0"/>
+              </a:rPr>
+              <a:t>)</a:t>
+            </a:r>
+            <a:r>
+              <a:rPr lang="en-IN" sz="2400" i="1" baseline="30000" dirty="0" smtClean="0">
+                <a:latin typeface="Times New Roman" panose="02020603050405020304" pitchFamily="18" charset="0"/>
+                <a:cs typeface="Times New Roman" panose="02020603050405020304" pitchFamily="18" charset="0"/>
+              </a:rPr>
+              <a:t>T</a:t>
+            </a:r>
+            <a:r>
+              <a:rPr lang="en-IN" sz="2400" dirty="0" smtClean="0">
+                <a:latin typeface="Times New Roman" panose="02020603050405020304" pitchFamily="18" charset="0"/>
+                <a:cs typeface="Times New Roman" panose="02020603050405020304" pitchFamily="18" charset="0"/>
+              </a:rPr>
+              <a:t> </a:t>
+            </a:r>
+            <a:r>
+              <a:rPr lang="en-IN" sz="2400" dirty="0" smtClean="0">
+                <a:latin typeface="Times New Roman" panose="02020603050405020304" pitchFamily="18" charset="0"/>
+                <a:cs typeface="Times New Roman" panose="02020603050405020304" pitchFamily="18" charset="0"/>
+              </a:rPr>
+              <a:t>is computed by solving system of equations  </a:t>
+            </a:r>
+            <a:r>
+              <a:rPr lang="en-IN" sz="2400" i="1" dirty="0" err="1" smtClean="0">
+                <a:latin typeface="Times New Roman" panose="02020603050405020304" pitchFamily="18" charset="0"/>
+                <a:cs typeface="Times New Roman" panose="02020603050405020304" pitchFamily="18" charset="0"/>
+              </a:rPr>
+              <a:t>A</a:t>
+            </a:r>
+            <a:r>
+              <a:rPr lang="en-IN" sz="2400" i="1" baseline="30000" dirty="0" err="1" smtClean="0">
+                <a:latin typeface="Times New Roman" panose="02020603050405020304" pitchFamily="18" charset="0"/>
+                <a:cs typeface="Times New Roman" panose="02020603050405020304" pitchFamily="18" charset="0"/>
+              </a:rPr>
+              <a:t>T</a:t>
+            </a:r>
+            <a:r>
+              <a:rPr lang="en-IN" sz="2400" i="1" dirty="0" err="1" smtClean="0">
+                <a:latin typeface="Times New Roman" panose="02020603050405020304" pitchFamily="18" charset="0"/>
+                <a:cs typeface="Times New Roman" panose="02020603050405020304" pitchFamily="18" charset="0"/>
+              </a:rPr>
+              <a:t>Aa</a:t>
+            </a:r>
+            <a:r>
+              <a:rPr lang="en-IN" sz="2400" i="1" dirty="0" smtClean="0">
+                <a:latin typeface="Times New Roman" panose="02020603050405020304" pitchFamily="18" charset="0"/>
+                <a:cs typeface="Times New Roman" panose="02020603050405020304" pitchFamily="18" charset="0"/>
+              </a:rPr>
+              <a:t>=</a:t>
+            </a:r>
+            <a:r>
+              <a:rPr lang="en-IN" sz="2400" i="1" dirty="0" err="1" smtClean="0">
+                <a:latin typeface="Times New Roman" panose="02020603050405020304" pitchFamily="18" charset="0"/>
+                <a:cs typeface="Times New Roman" panose="02020603050405020304" pitchFamily="18" charset="0"/>
+              </a:rPr>
+              <a:t>A</a:t>
+            </a:r>
+            <a:r>
+              <a:rPr lang="en-IN" sz="2400" i="1" baseline="30000" dirty="0" err="1" smtClean="0">
+                <a:latin typeface="Times New Roman" panose="02020603050405020304" pitchFamily="18" charset="0"/>
+                <a:cs typeface="Times New Roman" panose="02020603050405020304" pitchFamily="18" charset="0"/>
+              </a:rPr>
+              <a:t>T</a:t>
+            </a:r>
+            <a:r>
+              <a:rPr lang="en-IN" sz="2400" i="1" dirty="0" err="1" smtClean="0">
+                <a:latin typeface="Times New Roman" panose="02020603050405020304" pitchFamily="18" charset="0"/>
+                <a:cs typeface="Times New Roman" panose="02020603050405020304" pitchFamily="18" charset="0"/>
+              </a:rPr>
+              <a:t>U</a:t>
+            </a:r>
+            <a:r>
+              <a:rPr lang="en-IN" sz="2400" i="1" baseline="-25000" dirty="0" err="1" smtClean="0">
                 <a:latin typeface="Times New Roman" panose="02020603050405020304" pitchFamily="18" charset="0"/>
                 <a:cs typeface="Times New Roman" panose="02020603050405020304" pitchFamily="18" charset="0"/>
               </a:rPr>
               <a:t>h</a:t>
             </a:r>
             <a:r>
-              <a:rPr lang="en-IN" dirty="0" smtClean="0">
-                <a:latin typeface="Times New Roman" panose="02020603050405020304" pitchFamily="18" charset="0"/>
-                <a:cs typeface="Times New Roman" panose="02020603050405020304" pitchFamily="18" charset="0"/>
-              </a:rPr>
-              <a:t>-approximated </a:t>
-            </a:r>
-            <a:r>
-              <a:rPr lang="en-IN" dirty="0" smtClean="0">
-                <a:latin typeface="Times New Roman" panose="02020603050405020304" pitchFamily="18" charset="0"/>
-                <a:cs typeface="Times New Roman" panose="02020603050405020304" pitchFamily="18" charset="0"/>
-              </a:rPr>
-              <a:t>function. </a:t>
-            </a:r>
-          </a:p>
-          <a:p>
-            <a:r>
-              <a:rPr lang="en-IN" dirty="0" smtClean="0">
-                <a:latin typeface="Times New Roman" panose="02020603050405020304" pitchFamily="18" charset="0"/>
-                <a:cs typeface="Times New Roman" panose="02020603050405020304" pitchFamily="18" charset="0"/>
-              </a:rPr>
-              <a:t>Polynomial p</a:t>
-            </a:r>
-            <a:r>
-              <a:rPr lang="en-IN" baseline="-25000" dirty="0" smtClean="0">
-                <a:latin typeface="Times New Roman" panose="02020603050405020304" pitchFamily="18" charset="0"/>
-                <a:cs typeface="Times New Roman" panose="02020603050405020304" pitchFamily="18" charset="0"/>
-              </a:rPr>
-              <a:t>2</a:t>
-            </a:r>
-            <a:r>
-              <a:rPr lang="en-IN" dirty="0" smtClean="0">
-                <a:latin typeface="Times New Roman" panose="02020603050405020304" pitchFamily="18" charset="0"/>
-                <a:cs typeface="Times New Roman" panose="02020603050405020304" pitchFamily="18" charset="0"/>
-              </a:rPr>
-              <a:t>:  </a:t>
-            </a:r>
-            <a:r>
-              <a:rPr lang="en-IN" b="1" dirty="0">
-                <a:latin typeface="Times New Roman" panose="02020603050405020304" pitchFamily="18" charset="0"/>
-                <a:cs typeface="Times New Roman" panose="02020603050405020304" pitchFamily="18" charset="0"/>
-              </a:rPr>
-              <a:t>p</a:t>
-            </a:r>
-            <a:r>
-              <a:rPr lang="en-IN" b="1" baseline="-25000" dirty="0" smtClean="0">
-                <a:latin typeface="Times New Roman" panose="02020603050405020304" pitchFamily="18" charset="0"/>
-                <a:cs typeface="Times New Roman" panose="02020603050405020304" pitchFamily="18" charset="0"/>
-              </a:rPr>
-              <a:t>2 </a:t>
-            </a:r>
-            <a:r>
-              <a:rPr lang="en-IN" b="1" dirty="0" smtClean="0">
-                <a:latin typeface="Times New Roman" panose="02020603050405020304" pitchFamily="18" charset="0"/>
-                <a:cs typeface="Times New Roman" panose="02020603050405020304" pitchFamily="18" charset="0"/>
-              </a:rPr>
-              <a:t>(</a:t>
-            </a:r>
-            <a:r>
-              <a:rPr lang="en-IN" b="1" i="1" dirty="0" smtClean="0">
-                <a:latin typeface="Times New Roman" panose="02020603050405020304" pitchFamily="18" charset="0"/>
-                <a:cs typeface="Times New Roman" panose="02020603050405020304" pitchFamily="18" charset="0"/>
-              </a:rPr>
-              <a:t>x,y</a:t>
-            </a:r>
-            <a:r>
-              <a:rPr lang="en-IN" b="1" dirty="0" smtClean="0">
-                <a:latin typeface="Times New Roman" panose="02020603050405020304" pitchFamily="18" charset="0"/>
-                <a:cs typeface="Times New Roman" panose="02020603050405020304" pitchFamily="18" charset="0"/>
-              </a:rPr>
-              <a:t>;</a:t>
-            </a:r>
-            <a:r>
-              <a:rPr lang="en-IN" b="1" i="1" dirty="0" smtClean="0">
-                <a:latin typeface="Times New Roman" panose="02020603050405020304" pitchFamily="18" charset="0"/>
-                <a:cs typeface="Times New Roman" panose="02020603050405020304" pitchFamily="18" charset="0"/>
-              </a:rPr>
-              <a:t>N</a:t>
-            </a:r>
-            <a:r>
-              <a:rPr lang="en-IN" b="1" i="1" baseline="-25000" dirty="0" smtClean="0">
-                <a:latin typeface="Times New Roman" panose="02020603050405020304" pitchFamily="18" charset="0"/>
-                <a:cs typeface="Times New Roman" panose="02020603050405020304" pitchFamily="18" charset="0"/>
-              </a:rPr>
-              <a:t>0</a:t>
-            </a:r>
-            <a:r>
-              <a:rPr lang="en-IN" b="1" dirty="0" smtClean="0">
-                <a:latin typeface="Times New Roman" panose="02020603050405020304" pitchFamily="18" charset="0"/>
-                <a:cs typeface="Times New Roman" panose="02020603050405020304" pitchFamily="18" charset="0"/>
-              </a:rPr>
-              <a:t>)=</a:t>
-            </a:r>
-            <a:r>
-              <a:rPr lang="en-IN" b="1" i="1" dirty="0" smtClean="0">
-                <a:latin typeface="Times New Roman" panose="02020603050405020304" pitchFamily="18" charset="0"/>
-                <a:cs typeface="Times New Roman" panose="02020603050405020304" pitchFamily="18" charset="0"/>
-              </a:rPr>
-              <a:t>a</a:t>
-            </a:r>
-            <a:r>
-              <a:rPr lang="en-IN" b="1" i="1" baseline="-25000" dirty="0" smtClean="0">
-                <a:latin typeface="Times New Roman" panose="02020603050405020304" pitchFamily="18" charset="0"/>
-                <a:cs typeface="Times New Roman" panose="02020603050405020304" pitchFamily="18" charset="0"/>
-              </a:rPr>
-              <a:t>1</a:t>
-            </a:r>
-            <a:r>
-              <a:rPr lang="en-IN" b="1" dirty="0" smtClean="0">
-                <a:latin typeface="Times New Roman" panose="02020603050405020304" pitchFamily="18" charset="0"/>
-                <a:cs typeface="Times New Roman" panose="02020603050405020304" pitchFamily="18" charset="0"/>
-              </a:rPr>
-              <a:t>+</a:t>
-            </a:r>
-            <a:r>
-              <a:rPr lang="en-IN" b="1" i="1" dirty="0" smtClean="0">
-                <a:latin typeface="Times New Roman" panose="02020603050405020304" pitchFamily="18" charset="0"/>
-                <a:cs typeface="Times New Roman" panose="02020603050405020304" pitchFamily="18" charset="0"/>
-              </a:rPr>
-              <a:t>a</a:t>
-            </a:r>
-            <a:r>
-              <a:rPr lang="en-IN" b="1" i="1" baseline="-25000" dirty="0" smtClean="0">
-                <a:latin typeface="Times New Roman" panose="02020603050405020304" pitchFamily="18" charset="0"/>
-                <a:cs typeface="Times New Roman" panose="02020603050405020304" pitchFamily="18" charset="0"/>
-              </a:rPr>
-              <a:t>2</a:t>
-            </a:r>
-            <a:r>
-              <a:rPr lang="en-IN" b="1" i="1" dirty="0" smtClean="0">
-                <a:latin typeface="Times New Roman" panose="02020603050405020304" pitchFamily="18" charset="0"/>
-                <a:cs typeface="Times New Roman" panose="02020603050405020304" pitchFamily="18" charset="0"/>
-              </a:rPr>
-              <a:t>x</a:t>
-            </a:r>
-            <a:r>
-              <a:rPr lang="en-IN" b="1" dirty="0" smtClean="0">
-                <a:latin typeface="Times New Roman" panose="02020603050405020304" pitchFamily="18" charset="0"/>
-                <a:cs typeface="Times New Roman" panose="02020603050405020304" pitchFamily="18" charset="0"/>
-              </a:rPr>
-              <a:t>+</a:t>
-            </a:r>
-            <a:r>
-              <a:rPr lang="en-IN" b="1" i="1" dirty="0" smtClean="0">
-                <a:latin typeface="Times New Roman" panose="02020603050405020304" pitchFamily="18" charset="0"/>
-                <a:cs typeface="Times New Roman" panose="02020603050405020304" pitchFamily="18" charset="0"/>
-              </a:rPr>
-              <a:t>a</a:t>
-            </a:r>
-            <a:r>
-              <a:rPr lang="en-IN" b="1" i="1" baseline="-25000" dirty="0" smtClean="0">
-                <a:latin typeface="Times New Roman" panose="02020603050405020304" pitchFamily="18" charset="0"/>
-                <a:cs typeface="Times New Roman" panose="02020603050405020304" pitchFamily="18" charset="0"/>
-              </a:rPr>
-              <a:t>3</a:t>
-            </a:r>
-            <a:r>
-              <a:rPr lang="en-IN" b="1" i="1" dirty="0" smtClean="0">
-                <a:latin typeface="Times New Roman" panose="02020603050405020304" pitchFamily="18" charset="0"/>
-                <a:cs typeface="Times New Roman" panose="02020603050405020304" pitchFamily="18" charset="0"/>
-              </a:rPr>
-              <a:t>y</a:t>
-            </a:r>
-            <a:r>
-              <a:rPr lang="en-IN" b="1" dirty="0" smtClean="0">
-                <a:latin typeface="Times New Roman" panose="02020603050405020304" pitchFamily="18" charset="0"/>
-                <a:cs typeface="Times New Roman" panose="02020603050405020304" pitchFamily="18" charset="0"/>
-              </a:rPr>
-              <a:t>+</a:t>
-            </a:r>
-            <a:r>
-              <a:rPr lang="en-IN" b="1" i="1" dirty="0" smtClean="0">
-                <a:latin typeface="Times New Roman" panose="02020603050405020304" pitchFamily="18" charset="0"/>
-                <a:cs typeface="Times New Roman" panose="02020603050405020304" pitchFamily="18" charset="0"/>
-              </a:rPr>
-              <a:t>a</a:t>
-            </a:r>
-            <a:r>
-              <a:rPr lang="en-IN" b="1" i="1" baseline="-25000" dirty="0" smtClean="0">
-                <a:latin typeface="Times New Roman" panose="02020603050405020304" pitchFamily="18" charset="0"/>
-                <a:cs typeface="Times New Roman" panose="02020603050405020304" pitchFamily="18" charset="0"/>
-              </a:rPr>
-              <a:t>4</a:t>
-            </a:r>
-            <a:r>
-              <a:rPr lang="en-IN" b="1" i="1" dirty="0" smtClean="0">
-                <a:latin typeface="Times New Roman" panose="02020603050405020304" pitchFamily="18" charset="0"/>
-                <a:cs typeface="Times New Roman" panose="02020603050405020304" pitchFamily="18" charset="0"/>
-              </a:rPr>
-              <a:t>xy</a:t>
-            </a:r>
-            <a:r>
-              <a:rPr lang="en-IN" b="1" dirty="0" smtClean="0">
-                <a:latin typeface="Times New Roman" panose="02020603050405020304" pitchFamily="18" charset="0"/>
-                <a:cs typeface="Times New Roman" panose="02020603050405020304" pitchFamily="18" charset="0"/>
-              </a:rPr>
-              <a:t>+</a:t>
-            </a:r>
-            <a:r>
-              <a:rPr lang="en-IN" b="1" i="1" dirty="0" smtClean="0">
-                <a:latin typeface="Times New Roman" panose="02020603050405020304" pitchFamily="18" charset="0"/>
-                <a:cs typeface="Times New Roman" panose="02020603050405020304" pitchFamily="18" charset="0"/>
-              </a:rPr>
-              <a:t>a</a:t>
-            </a:r>
-            <a:r>
-              <a:rPr lang="en-IN" b="1" i="1" baseline="-25000" dirty="0" smtClean="0">
-                <a:latin typeface="Times New Roman" panose="02020603050405020304" pitchFamily="18" charset="0"/>
-                <a:cs typeface="Times New Roman" panose="02020603050405020304" pitchFamily="18" charset="0"/>
-              </a:rPr>
-              <a:t>5</a:t>
-            </a:r>
-            <a:r>
-              <a:rPr lang="en-IN" b="1" i="1" dirty="0" smtClean="0">
-                <a:latin typeface="Times New Roman" panose="02020603050405020304" pitchFamily="18" charset="0"/>
-                <a:cs typeface="Times New Roman" panose="02020603050405020304" pitchFamily="18" charset="0"/>
-              </a:rPr>
-              <a:t>x</a:t>
-            </a:r>
-            <a:r>
-              <a:rPr lang="en-IN" b="1" i="1" baseline="30000" dirty="0" smtClean="0">
-                <a:latin typeface="Times New Roman" panose="02020603050405020304" pitchFamily="18" charset="0"/>
-                <a:cs typeface="Times New Roman" panose="02020603050405020304" pitchFamily="18" charset="0"/>
-              </a:rPr>
-              <a:t>2</a:t>
-            </a:r>
-            <a:r>
-              <a:rPr lang="en-IN" b="1" dirty="0" smtClean="0">
-                <a:latin typeface="Times New Roman" panose="02020603050405020304" pitchFamily="18" charset="0"/>
-                <a:cs typeface="Times New Roman" panose="02020603050405020304" pitchFamily="18" charset="0"/>
-              </a:rPr>
-              <a:t>+</a:t>
-            </a:r>
-            <a:r>
-              <a:rPr lang="en-IN" b="1" i="1" dirty="0" smtClean="0">
-                <a:latin typeface="Times New Roman" panose="02020603050405020304" pitchFamily="18" charset="0"/>
-                <a:cs typeface="Times New Roman" panose="02020603050405020304" pitchFamily="18" charset="0"/>
-              </a:rPr>
-              <a:t>a</a:t>
-            </a:r>
-            <a:r>
-              <a:rPr lang="en-IN" b="1" i="1" baseline="-25000" dirty="0" smtClean="0">
-                <a:latin typeface="Times New Roman" panose="02020603050405020304" pitchFamily="18" charset="0"/>
-                <a:cs typeface="Times New Roman" panose="02020603050405020304" pitchFamily="18" charset="0"/>
-              </a:rPr>
-              <a:t>6</a:t>
-            </a:r>
-            <a:r>
-              <a:rPr lang="en-IN" b="1" i="1" dirty="0" smtClean="0">
-                <a:latin typeface="Times New Roman" panose="02020603050405020304" pitchFamily="18" charset="0"/>
-                <a:cs typeface="Times New Roman" panose="02020603050405020304" pitchFamily="18" charset="0"/>
-              </a:rPr>
-              <a:t>y</a:t>
-            </a:r>
-            <a:r>
-              <a:rPr lang="en-IN" b="1" i="1" baseline="30000" dirty="0" smtClean="0">
-                <a:latin typeface="Times New Roman" panose="02020603050405020304" pitchFamily="18" charset="0"/>
-                <a:cs typeface="Times New Roman" panose="02020603050405020304" pitchFamily="18" charset="0"/>
-              </a:rPr>
-              <a:t>2</a:t>
-            </a:r>
-            <a:endParaRPr lang="en-IN" b="1" i="1" baseline="30000" dirty="0" smtClean="0">
+              <a:rPr lang="en-IN" sz="2400" i="1" dirty="0" smtClean="0">
+                <a:latin typeface="Times New Roman" panose="02020603050405020304" pitchFamily="18" charset="0"/>
+                <a:cs typeface="Times New Roman" panose="02020603050405020304" pitchFamily="18" charset="0"/>
+              </a:rPr>
+              <a:t>.</a:t>
+            </a:r>
+          </a:p>
+          <a:p>
+            <a:r>
+              <a:rPr lang="en-IN" sz="2400" dirty="0" smtClean="0">
+                <a:latin typeface="Times New Roman" panose="02020603050405020304" pitchFamily="18" charset="0"/>
+                <a:cs typeface="Times New Roman" panose="02020603050405020304" pitchFamily="18" charset="0"/>
+              </a:rPr>
+              <a:t>In order to have a unique solution the matrix A should have ful</a:t>
+            </a:r>
+            <a:r>
+              <a:rPr lang="en-IN" sz="2400" dirty="0" smtClean="0">
+                <a:latin typeface="Times New Roman" panose="02020603050405020304" pitchFamily="18" charset="0"/>
+                <a:cs typeface="Times New Roman" panose="02020603050405020304" pitchFamily="18" charset="0"/>
+              </a:rPr>
+              <a:t>l rank, which is satisfied if mesh nodes are reasonably distributed.</a:t>
+            </a:r>
+            <a:endParaRPr lang="en-IN" sz="2400" dirty="0">
               <a:latin typeface="Times New Roman" panose="02020603050405020304" pitchFamily="18" charset="0"/>
               <a:cs typeface="Times New Roman" panose="02020603050405020304" pitchFamily="18" charset="0"/>
             </a:endParaRPr>
-          </a:p>
-          <a:p>
-            <a:r>
-              <a:rPr lang="en-IN" dirty="0" err="1" smtClean="0">
-                <a:latin typeface="Times New Roman" panose="02020603050405020304" pitchFamily="18" charset="0"/>
-                <a:cs typeface="Times New Roman" panose="02020603050405020304" pitchFamily="18" charset="0"/>
-              </a:rPr>
-              <a:t>Coeff</a:t>
-            </a:r>
-            <a:r>
-              <a:rPr lang="en-IN" dirty="0" smtClean="0">
-                <a:latin typeface="Times New Roman" panose="02020603050405020304" pitchFamily="18" charset="0"/>
-                <a:cs typeface="Times New Roman" panose="02020603050405020304" pitchFamily="18" charset="0"/>
-              </a:rPr>
-              <a:t>. </a:t>
-            </a:r>
-            <a:r>
-              <a:rPr lang="en-IN" dirty="0" smtClean="0">
-                <a:latin typeface="Times New Roman" panose="02020603050405020304" pitchFamily="18" charset="0"/>
-                <a:cs typeface="Times New Roman" panose="02020603050405020304" pitchFamily="18" charset="0"/>
-              </a:rPr>
-              <a:t>vector </a:t>
-            </a:r>
-            <a:r>
-              <a:rPr lang="en-IN" i="1" dirty="0" smtClean="0">
-                <a:latin typeface="Times New Roman" panose="02020603050405020304" pitchFamily="18" charset="0"/>
-                <a:cs typeface="Times New Roman" panose="02020603050405020304" pitchFamily="18" charset="0"/>
-              </a:rPr>
-              <a:t>a</a:t>
-            </a:r>
-            <a:r>
-              <a:rPr lang="en-IN" dirty="0" smtClean="0">
-                <a:latin typeface="Times New Roman" panose="02020603050405020304" pitchFamily="18" charset="0"/>
-                <a:cs typeface="Times New Roman" panose="02020603050405020304" pitchFamily="18" charset="0"/>
-              </a:rPr>
-              <a:t>=(</a:t>
-            </a:r>
-            <a:r>
-              <a:rPr lang="en-IN" i="1" dirty="0" smtClean="0">
-                <a:latin typeface="Times New Roman" panose="02020603050405020304" pitchFamily="18" charset="0"/>
-                <a:cs typeface="Times New Roman" panose="02020603050405020304" pitchFamily="18" charset="0"/>
-              </a:rPr>
-              <a:t>a</a:t>
-            </a:r>
-            <a:r>
-              <a:rPr lang="en-IN" i="1" baseline="-25000" dirty="0" smtClean="0">
-                <a:latin typeface="Times New Roman" panose="02020603050405020304" pitchFamily="18" charset="0"/>
-                <a:cs typeface="Times New Roman" panose="02020603050405020304" pitchFamily="18" charset="0"/>
-              </a:rPr>
-              <a:t>1</a:t>
-            </a:r>
-            <a:r>
-              <a:rPr lang="en-IN" i="1" dirty="0" smtClean="0">
-                <a:latin typeface="Times New Roman" panose="02020603050405020304" pitchFamily="18" charset="0"/>
-                <a:cs typeface="Times New Roman" panose="02020603050405020304" pitchFamily="18" charset="0"/>
-              </a:rPr>
-              <a:t>,a</a:t>
-            </a:r>
-            <a:r>
-              <a:rPr lang="en-IN" i="1" baseline="-25000" dirty="0" smtClean="0">
-                <a:latin typeface="Times New Roman" panose="02020603050405020304" pitchFamily="18" charset="0"/>
-                <a:cs typeface="Times New Roman" panose="02020603050405020304" pitchFamily="18" charset="0"/>
-              </a:rPr>
-              <a:t>2</a:t>
-            </a:r>
-            <a:r>
-              <a:rPr lang="en-IN" i="1" dirty="0" smtClean="0">
-                <a:latin typeface="Times New Roman" panose="02020603050405020304" pitchFamily="18" charset="0"/>
-                <a:cs typeface="Times New Roman" panose="02020603050405020304" pitchFamily="18" charset="0"/>
-              </a:rPr>
-              <a:t>,a</a:t>
-            </a:r>
-            <a:r>
-              <a:rPr lang="en-IN" i="1" baseline="-25000" dirty="0" smtClean="0">
-                <a:latin typeface="Times New Roman" panose="02020603050405020304" pitchFamily="18" charset="0"/>
-                <a:cs typeface="Times New Roman" panose="02020603050405020304" pitchFamily="18" charset="0"/>
-              </a:rPr>
-              <a:t>3</a:t>
-            </a:r>
-            <a:r>
-              <a:rPr lang="en-IN" i="1" dirty="0" smtClean="0">
-                <a:latin typeface="Times New Roman" panose="02020603050405020304" pitchFamily="18" charset="0"/>
-                <a:cs typeface="Times New Roman" panose="02020603050405020304" pitchFamily="18" charset="0"/>
-              </a:rPr>
-              <a:t>,a</a:t>
-            </a:r>
-            <a:r>
-              <a:rPr lang="en-IN" i="1" baseline="-25000" dirty="0" smtClean="0">
-                <a:latin typeface="Times New Roman" panose="02020603050405020304" pitchFamily="18" charset="0"/>
-                <a:cs typeface="Times New Roman" panose="02020603050405020304" pitchFamily="18" charset="0"/>
-              </a:rPr>
-              <a:t>4</a:t>
-            </a:r>
-            <a:r>
-              <a:rPr lang="en-IN" i="1" dirty="0" smtClean="0">
-                <a:latin typeface="Times New Roman" panose="02020603050405020304" pitchFamily="18" charset="0"/>
-                <a:cs typeface="Times New Roman" panose="02020603050405020304" pitchFamily="18" charset="0"/>
-              </a:rPr>
-              <a:t>,a</a:t>
-            </a:r>
-            <a:r>
-              <a:rPr lang="en-IN" i="1" baseline="-25000" dirty="0" smtClean="0">
-                <a:latin typeface="Times New Roman" panose="02020603050405020304" pitchFamily="18" charset="0"/>
-                <a:cs typeface="Times New Roman" panose="02020603050405020304" pitchFamily="18" charset="0"/>
-              </a:rPr>
-              <a:t>5</a:t>
-            </a:r>
-            <a:r>
-              <a:rPr lang="en-IN" i="1" dirty="0" smtClean="0">
-                <a:latin typeface="Times New Roman" panose="02020603050405020304" pitchFamily="18" charset="0"/>
-                <a:cs typeface="Times New Roman" panose="02020603050405020304" pitchFamily="18" charset="0"/>
-              </a:rPr>
-              <a:t>,a</a:t>
-            </a:r>
-            <a:r>
-              <a:rPr lang="en-IN" i="1" baseline="-25000" dirty="0" smtClean="0">
-                <a:latin typeface="Times New Roman" panose="02020603050405020304" pitchFamily="18" charset="0"/>
-                <a:cs typeface="Times New Roman" panose="02020603050405020304" pitchFamily="18" charset="0"/>
-              </a:rPr>
-              <a:t>6</a:t>
-            </a:r>
-            <a:r>
-              <a:rPr lang="en-IN" dirty="0" smtClean="0">
-                <a:latin typeface="Times New Roman" panose="02020603050405020304" pitchFamily="18" charset="0"/>
-                <a:cs typeface="Times New Roman" panose="02020603050405020304" pitchFamily="18" charset="0"/>
-              </a:rPr>
-              <a:t>)</a:t>
-            </a:r>
-            <a:r>
-              <a:rPr lang="en-IN" i="1" baseline="30000" dirty="0" smtClean="0">
-                <a:latin typeface="Times New Roman" panose="02020603050405020304" pitchFamily="18" charset="0"/>
-                <a:cs typeface="Times New Roman" panose="02020603050405020304" pitchFamily="18" charset="0"/>
-              </a:rPr>
-              <a:t>T</a:t>
-            </a:r>
-            <a:r>
-              <a:rPr lang="en-IN" dirty="0" smtClean="0">
-                <a:latin typeface="Times New Roman" panose="02020603050405020304" pitchFamily="18" charset="0"/>
-                <a:cs typeface="Times New Roman" panose="02020603050405020304" pitchFamily="18" charset="0"/>
-              </a:rPr>
-              <a:t> is computed by solving system of equations  </a:t>
-            </a:r>
-            <a:r>
-              <a:rPr lang="en-IN" i="1" dirty="0" err="1" smtClean="0">
-                <a:latin typeface="Times New Roman" panose="02020603050405020304" pitchFamily="18" charset="0"/>
-                <a:cs typeface="Times New Roman" panose="02020603050405020304" pitchFamily="18" charset="0"/>
-              </a:rPr>
-              <a:t>A</a:t>
-            </a:r>
-            <a:r>
-              <a:rPr lang="en-IN" i="1" baseline="30000" dirty="0" err="1" smtClean="0">
-                <a:latin typeface="Times New Roman" panose="02020603050405020304" pitchFamily="18" charset="0"/>
-                <a:cs typeface="Times New Roman" panose="02020603050405020304" pitchFamily="18" charset="0"/>
-              </a:rPr>
-              <a:t>T</a:t>
-            </a:r>
-            <a:r>
-              <a:rPr lang="en-IN" i="1" dirty="0" err="1" smtClean="0">
-                <a:latin typeface="Times New Roman" panose="02020603050405020304" pitchFamily="18" charset="0"/>
-                <a:cs typeface="Times New Roman" panose="02020603050405020304" pitchFamily="18" charset="0"/>
-              </a:rPr>
-              <a:t>Aa</a:t>
-            </a:r>
-            <a:r>
-              <a:rPr lang="en-IN" i="1" dirty="0" smtClean="0">
-                <a:latin typeface="Times New Roman" panose="02020603050405020304" pitchFamily="18" charset="0"/>
-                <a:cs typeface="Times New Roman" panose="02020603050405020304" pitchFamily="18" charset="0"/>
-              </a:rPr>
-              <a:t>=</a:t>
-            </a:r>
-            <a:r>
-              <a:rPr lang="en-IN" i="1" dirty="0" err="1" smtClean="0">
-                <a:latin typeface="Times New Roman" panose="02020603050405020304" pitchFamily="18" charset="0"/>
-                <a:cs typeface="Times New Roman" panose="02020603050405020304" pitchFamily="18" charset="0"/>
-              </a:rPr>
-              <a:t>A</a:t>
-            </a:r>
-            <a:r>
-              <a:rPr lang="en-IN" i="1" baseline="30000" dirty="0" err="1" smtClean="0">
-                <a:latin typeface="Times New Roman" panose="02020603050405020304" pitchFamily="18" charset="0"/>
-                <a:cs typeface="Times New Roman" panose="02020603050405020304" pitchFamily="18" charset="0"/>
-              </a:rPr>
-              <a:t>T</a:t>
-            </a:r>
-            <a:r>
-              <a:rPr lang="en-IN" i="1" dirty="0" err="1" smtClean="0">
-                <a:latin typeface="Times New Roman" panose="02020603050405020304" pitchFamily="18" charset="0"/>
-                <a:cs typeface="Times New Roman" panose="02020603050405020304" pitchFamily="18" charset="0"/>
-              </a:rPr>
-              <a:t>U</a:t>
-            </a:r>
-            <a:r>
-              <a:rPr lang="en-IN" i="1" baseline="-25000" dirty="0" err="1" smtClean="0">
-                <a:latin typeface="Times New Roman" panose="02020603050405020304" pitchFamily="18" charset="0"/>
-                <a:cs typeface="Times New Roman" panose="02020603050405020304" pitchFamily="18" charset="0"/>
-              </a:rPr>
-              <a:t>h</a:t>
-            </a:r>
-            <a:r>
-              <a:rPr lang="en-IN" i="1" dirty="0">
-                <a:latin typeface="Times New Roman" panose="02020603050405020304" pitchFamily="18" charset="0"/>
-                <a:cs typeface="Times New Roman" panose="02020603050405020304" pitchFamily="18" charset="0"/>
-              </a:rPr>
-              <a:t>.</a:t>
-            </a:r>
           </a:p>
         </p:txBody>
       </p:sp>
@@ -9459,7 +9584,7 @@
         </p:blipFill>
         <p:spPr>
           <a:xfrm>
-            <a:off x="947736" y="4137819"/>
+            <a:off x="947736" y="4180683"/>
             <a:ext cx="6234114" cy="1468437"/>
           </a:xfrm>
           <a:prstGeom prst="rect">
@@ -9483,7 +9608,7 @@
         </p:blipFill>
         <p:spPr>
           <a:xfrm>
-            <a:off x="7415208" y="4377526"/>
+            <a:off x="7415208" y="4334662"/>
             <a:ext cx="4171950" cy="1085850"/>
           </a:xfrm>
           <a:prstGeom prst="rect">
@@ -9665,26 +9790,8 @@
                 <a:latin typeface="Times New Roman" panose="02020603050405020304" pitchFamily="18" charset="0"/>
                 <a:cs typeface="Times New Roman" panose="02020603050405020304" pitchFamily="18" charset="0"/>
               </a:rPr>
-              <a:t>The </a:t>
-            </a:r>
-            <a:r>
-              <a:rPr lang="en-IN" dirty="0" smtClean="0">
-                <a:latin typeface="Times New Roman" panose="02020603050405020304" pitchFamily="18" charset="0"/>
-                <a:cs typeface="Times New Roman" panose="02020603050405020304" pitchFamily="18" charset="0"/>
-              </a:rPr>
-              <a:t>process is similar to the smoothing process described for the quadratic least squares ﬁtting except for the order of the ﬁtting polynomial. Here, a linear regression is </a:t>
-            </a:r>
-            <a:r>
-              <a:rPr lang="en-IN" dirty="0" smtClean="0">
-                <a:latin typeface="Times New Roman" panose="02020603050405020304" pitchFamily="18" charset="0"/>
-                <a:cs typeface="Times New Roman" panose="02020603050405020304" pitchFamily="18" charset="0"/>
-              </a:rPr>
-              <a:t>applied to smooth the points.</a:t>
-            </a:r>
-            <a:endParaRPr lang="en-IN" dirty="0" smtClean="0">
-              <a:latin typeface="Times New Roman" panose="02020603050405020304" pitchFamily="18" charset="0"/>
-              <a:cs typeface="Times New Roman" panose="02020603050405020304" pitchFamily="18" charset="0"/>
-            </a:endParaRPr>
+              <a:t>The process is similar to the smoothing process described for the quadratic least squares ﬁtting except for the order of the ﬁtting polynomial. Here, a linear regression is applied to smooth the points.</a:t>
+            </a:r>
           </a:p>
           <a:p>
             <a:pPr lvl="1"/>
@@ -10167,8 +10274,12 @@
                 <a:latin typeface="Times New Roman" panose="02020603050405020304" pitchFamily="18" charset="0"/>
                 <a:cs typeface="Times New Roman" panose="02020603050405020304" pitchFamily="18" charset="0"/>
               </a:rPr>
-              <a:t>Rank of A.</a:t>
-            </a:r>
+              <a:t>Since every node has at least 2 non-collinear neighbours, the matrix A always has full rank and system is well defined. </a:t>
+            </a:r>
+            <a:endParaRPr lang="en-IN" dirty="0" smtClean="0">
+              <a:latin typeface="Times New Roman" panose="02020603050405020304" pitchFamily="18" charset="0"/>
+              <a:cs typeface="Times New Roman" panose="02020603050405020304" pitchFamily="18" charset="0"/>
+            </a:endParaRPr>
           </a:p>
           <a:p>
             <a:r>
@@ -10251,7 +10362,7 @@
         </p:blipFill>
         <p:spPr>
           <a:xfrm>
-            <a:off x="2995612" y="3630612"/>
+            <a:off x="2995612" y="4173535"/>
             <a:ext cx="4948237" cy="619125"/>
           </a:xfrm>
           <a:prstGeom prst="rect">
@@ -10275,7 +10386,7 @@
         </p:blipFill>
         <p:spPr>
           <a:xfrm>
-            <a:off x="2995612" y="1178720"/>
+            <a:off x="2995612" y="1121568"/>
             <a:ext cx="4405314" cy="1433513"/>
           </a:xfrm>
           <a:prstGeom prst="rect">

</xml_diff>